<commit_message>
Added address generation chart
</commit_message>
<xml_diff>
--- a/docs/charts.pptx
+++ b/docs/charts.pptx
@@ -6,6 +6,7 @@
   </p:sldMasterIdLst>
   <p:sldIdLst>
     <p:sldId id="256" r:id="rId2"/>
+    <p:sldId id="257" r:id="rId3"/>
   </p:sldIdLst>
   <p:sldSz cx="12192000" cy="6858000"/>
   <p:notesSz cx="6858000" cy="9144000"/>
@@ -259,7 +260,7 @@
           <a:p>
             <a:fld id="{58537782-5515-4277-8890-BE805010C87F}" type="datetimeFigureOut">
               <a:rPr lang="en-US" smtClean="0"/>
-              <a:t>3/24/2021</a:t>
+              <a:t>3/28/2021</a:t>
             </a:fld>
             <a:endParaRPr lang="en-US"/>
           </a:p>
@@ -457,7 +458,7 @@
           <a:p>
             <a:fld id="{58537782-5515-4277-8890-BE805010C87F}" type="datetimeFigureOut">
               <a:rPr lang="en-US" smtClean="0"/>
-              <a:t>3/24/2021</a:t>
+              <a:t>3/28/2021</a:t>
             </a:fld>
             <a:endParaRPr lang="en-US"/>
           </a:p>
@@ -665,7 +666,7 @@
           <a:p>
             <a:fld id="{58537782-5515-4277-8890-BE805010C87F}" type="datetimeFigureOut">
               <a:rPr lang="en-US" smtClean="0"/>
-              <a:t>3/24/2021</a:t>
+              <a:t>3/28/2021</a:t>
             </a:fld>
             <a:endParaRPr lang="en-US"/>
           </a:p>
@@ -863,7 +864,7 @@
           <a:p>
             <a:fld id="{58537782-5515-4277-8890-BE805010C87F}" type="datetimeFigureOut">
               <a:rPr lang="en-US" smtClean="0"/>
-              <a:t>3/24/2021</a:t>
+              <a:t>3/28/2021</a:t>
             </a:fld>
             <a:endParaRPr lang="en-US"/>
           </a:p>
@@ -1138,7 +1139,7 @@
           <a:p>
             <a:fld id="{58537782-5515-4277-8890-BE805010C87F}" type="datetimeFigureOut">
               <a:rPr lang="en-US" smtClean="0"/>
-              <a:t>3/24/2021</a:t>
+              <a:t>3/28/2021</a:t>
             </a:fld>
             <a:endParaRPr lang="en-US"/>
           </a:p>
@@ -1403,7 +1404,7 @@
           <a:p>
             <a:fld id="{58537782-5515-4277-8890-BE805010C87F}" type="datetimeFigureOut">
               <a:rPr lang="en-US" smtClean="0"/>
-              <a:t>3/24/2021</a:t>
+              <a:t>3/28/2021</a:t>
             </a:fld>
             <a:endParaRPr lang="en-US"/>
           </a:p>
@@ -1815,7 +1816,7 @@
           <a:p>
             <a:fld id="{58537782-5515-4277-8890-BE805010C87F}" type="datetimeFigureOut">
               <a:rPr lang="en-US" smtClean="0"/>
-              <a:t>3/24/2021</a:t>
+              <a:t>3/28/2021</a:t>
             </a:fld>
             <a:endParaRPr lang="en-US"/>
           </a:p>
@@ -1956,7 +1957,7 @@
           <a:p>
             <a:fld id="{58537782-5515-4277-8890-BE805010C87F}" type="datetimeFigureOut">
               <a:rPr lang="en-US" smtClean="0"/>
-              <a:t>3/24/2021</a:t>
+              <a:t>3/28/2021</a:t>
             </a:fld>
             <a:endParaRPr lang="en-US"/>
           </a:p>
@@ -2069,7 +2070,7 @@
           <a:p>
             <a:fld id="{58537782-5515-4277-8890-BE805010C87F}" type="datetimeFigureOut">
               <a:rPr lang="en-US" smtClean="0"/>
-              <a:t>3/24/2021</a:t>
+              <a:t>3/28/2021</a:t>
             </a:fld>
             <a:endParaRPr lang="en-US"/>
           </a:p>
@@ -2380,7 +2381,7 @@
           <a:p>
             <a:fld id="{58537782-5515-4277-8890-BE805010C87F}" type="datetimeFigureOut">
               <a:rPr lang="en-US" smtClean="0"/>
-              <a:t>3/24/2021</a:t>
+              <a:t>3/28/2021</a:t>
             </a:fld>
             <a:endParaRPr lang="en-US"/>
           </a:p>
@@ -2668,7 +2669,7 @@
           <a:p>
             <a:fld id="{58537782-5515-4277-8890-BE805010C87F}" type="datetimeFigureOut">
               <a:rPr lang="en-US" smtClean="0"/>
-              <a:t>3/24/2021</a:t>
+              <a:t>3/28/2021</a:t>
             </a:fld>
             <a:endParaRPr lang="en-US"/>
           </a:p>
@@ -2909,7 +2910,7 @@
           <a:p>
             <a:fld id="{58537782-5515-4277-8890-BE805010C87F}" type="datetimeFigureOut">
               <a:rPr lang="en-US" smtClean="0"/>
-              <a:t>3/24/2021</a:t>
+              <a:t>3/28/2021</a:t>
             </a:fld>
             <a:endParaRPr lang="en-US"/>
           </a:p>
@@ -3946,6 +3947,2987 @@
 </p:sld>
 </file>
 
+<file path=ppt/slides/slide2.xml><?xml version="1.0" encoding="utf-8"?>
+<p:sld xmlns:a="http://schemas.openxmlformats.org/drawingml/2006/main" xmlns:r="http://schemas.openxmlformats.org/officeDocument/2006/relationships" xmlns:p="http://schemas.openxmlformats.org/presentationml/2006/main">
+  <p:cSld>
+    <p:spTree>
+      <p:nvGrpSpPr>
+        <p:cNvPr id="1" name=""/>
+        <p:cNvGrpSpPr/>
+        <p:nvPr/>
+      </p:nvGrpSpPr>
+      <p:grpSpPr>
+        <a:xfrm>
+          <a:off x="0" y="0"/>
+          <a:ext cx="0" cy="0"/>
+          <a:chOff x="0" y="0"/>
+          <a:chExt cx="0" cy="0"/>
+        </a:xfrm>
+      </p:grpSpPr>
+      <p:sp>
+        <p:nvSpPr>
+          <p:cNvPr id="4" name="TextBox 3">
+            <a:extLst>
+              <a:ext uri="{FF2B5EF4-FFF2-40B4-BE49-F238E27FC236}">
+                <a16:creationId xmlns:a16="http://schemas.microsoft.com/office/drawing/2014/main" id="{911E284F-B3C6-4D86-B2F7-9EDB02D1A0D3}"/>
+              </a:ext>
+            </a:extLst>
+          </p:cNvPr>
+          <p:cNvSpPr txBox="1"/>
+          <p:nvPr/>
+        </p:nvSpPr>
+        <p:spPr>
+          <a:xfrm>
+            <a:off x="139286" y="1881523"/>
+            <a:ext cx="1971312" cy="369332"/>
+          </a:xfrm>
+          <a:prstGeom prst="rect">
+            <a:avLst/>
+          </a:prstGeom>
+        </p:spPr>
+        <p:style>
+          <a:lnRef idx="0">
+            <a:schemeClr val="accent4"/>
+          </a:lnRef>
+          <a:fillRef idx="3">
+            <a:schemeClr val="accent4"/>
+          </a:fillRef>
+          <a:effectRef idx="3">
+            <a:schemeClr val="accent4"/>
+          </a:effectRef>
+          <a:fontRef idx="minor">
+            <a:schemeClr val="lt1"/>
+          </a:fontRef>
+        </p:style>
+        <p:txBody>
+          <a:bodyPr wrap="square" rtlCol="0">
+            <a:noAutofit/>
+          </a:bodyPr>
+          <a:lstStyle/>
+          <a:p>
+            <a:pPr algn="ctr"/>
+            <a:r>
+              <a:rPr lang="en-US" b="1" dirty="0"/>
+              <a:t>Master node</a:t>
+            </a:r>
+          </a:p>
+        </p:txBody>
+      </p:sp>
+      <p:sp>
+        <p:nvSpPr>
+          <p:cNvPr id="5" name="TextBox 4">
+            <a:extLst>
+              <a:ext uri="{FF2B5EF4-FFF2-40B4-BE49-F238E27FC236}">
+                <a16:creationId xmlns:a16="http://schemas.microsoft.com/office/drawing/2014/main" id="{6ED6B1AF-C210-4C85-80FC-07C3E5D3A3A8}"/>
+              </a:ext>
+            </a:extLst>
+          </p:cNvPr>
+          <p:cNvSpPr txBox="1"/>
+          <p:nvPr/>
+        </p:nvSpPr>
+        <p:spPr>
+          <a:xfrm>
+            <a:off x="5443961" y="728304"/>
+            <a:ext cx="2020903" cy="369332"/>
+          </a:xfrm>
+          <a:prstGeom prst="rect">
+            <a:avLst/>
+          </a:prstGeom>
+          <a:ln/>
+        </p:spPr>
+        <p:style>
+          <a:lnRef idx="0">
+            <a:schemeClr val="accent3"/>
+          </a:lnRef>
+          <a:fillRef idx="3">
+            <a:schemeClr val="accent3"/>
+          </a:fillRef>
+          <a:effectRef idx="3">
+            <a:schemeClr val="accent3"/>
+          </a:effectRef>
+          <a:fontRef idx="minor">
+            <a:schemeClr val="lt1"/>
+          </a:fontRef>
+        </p:style>
+        <p:txBody>
+          <a:bodyPr wrap="square" rtlCol="0">
+            <a:noAutofit/>
+          </a:bodyPr>
+          <a:lstStyle/>
+          <a:p>
+            <a:pPr algn="ctr"/>
+            <a:r>
+              <a:rPr lang="en-US" b="1" dirty="0"/>
+              <a:t>CHAIN LEVEL [0, 1]</a:t>
+            </a:r>
+          </a:p>
+        </p:txBody>
+      </p:sp>
+      <p:sp>
+        <p:nvSpPr>
+          <p:cNvPr id="13" name="TextBox 12">
+            <a:extLst>
+              <a:ext uri="{FF2B5EF4-FFF2-40B4-BE49-F238E27FC236}">
+                <a16:creationId xmlns:a16="http://schemas.microsoft.com/office/drawing/2014/main" id="{309A127E-4B29-4A02-A606-738B6E68822A}"/>
+              </a:ext>
+            </a:extLst>
+          </p:cNvPr>
+          <p:cNvSpPr txBox="1"/>
+          <p:nvPr/>
+        </p:nvSpPr>
+        <p:spPr>
+          <a:xfrm>
+            <a:off x="8021713" y="728304"/>
+            <a:ext cx="3848395" cy="369332"/>
+          </a:xfrm>
+          <a:prstGeom prst="rect">
+            <a:avLst/>
+          </a:prstGeom>
+        </p:spPr>
+        <p:style>
+          <a:lnRef idx="0">
+            <a:schemeClr val="accent2"/>
+          </a:lnRef>
+          <a:fillRef idx="3">
+            <a:schemeClr val="accent2"/>
+          </a:fillRef>
+          <a:effectRef idx="3">
+            <a:schemeClr val="accent2"/>
+          </a:effectRef>
+          <a:fontRef idx="minor">
+            <a:schemeClr val="lt1"/>
+          </a:fontRef>
+        </p:style>
+        <p:txBody>
+          <a:bodyPr wrap="square" rtlCol="0">
+            <a:noAutofit/>
+          </a:bodyPr>
+          <a:lstStyle/>
+          <a:p>
+            <a:pPr algn="ctr"/>
+            <a:r>
+              <a:rPr lang="en-US" b="1" dirty="0"/>
+              <a:t>ADDRESS LEVEL [0..n]</a:t>
+            </a:r>
+          </a:p>
+        </p:txBody>
+      </p:sp>
+      <p:sp>
+        <p:nvSpPr>
+          <p:cNvPr id="14" name="TextBox 13">
+            <a:extLst>
+              <a:ext uri="{FF2B5EF4-FFF2-40B4-BE49-F238E27FC236}">
+                <a16:creationId xmlns:a16="http://schemas.microsoft.com/office/drawing/2014/main" id="{64AB0DE1-D238-499D-A003-51072DFB38D2}"/>
+              </a:ext>
+            </a:extLst>
+          </p:cNvPr>
+          <p:cNvSpPr txBox="1"/>
+          <p:nvPr/>
+        </p:nvSpPr>
+        <p:spPr>
+          <a:xfrm>
+            <a:off x="8021712" y="1881522"/>
+            <a:ext cx="1071883" cy="369332"/>
+          </a:xfrm>
+          <a:prstGeom prst="rect">
+            <a:avLst/>
+          </a:prstGeom>
+        </p:spPr>
+        <p:style>
+          <a:lnRef idx="0">
+            <a:schemeClr val="accent2"/>
+          </a:lnRef>
+          <a:fillRef idx="3">
+            <a:schemeClr val="accent2"/>
+          </a:fillRef>
+          <a:effectRef idx="3">
+            <a:schemeClr val="accent2"/>
+          </a:effectRef>
+          <a:fontRef idx="minor">
+            <a:schemeClr val="lt1"/>
+          </a:fontRef>
+        </p:style>
+        <p:txBody>
+          <a:bodyPr wrap="square" rtlCol="0">
+            <a:noAutofit/>
+          </a:bodyPr>
+          <a:lstStyle/>
+          <a:p>
+            <a:pPr algn="ctr"/>
+            <a:r>
+              <a:rPr lang="en-US" b="1" dirty="0" err="1"/>
+              <a:t>Adr</a:t>
+            </a:r>
+            <a:r>
+              <a:rPr lang="en-US" b="1" dirty="0"/>
+              <a:t> 0</a:t>
+            </a:r>
+          </a:p>
+        </p:txBody>
+      </p:sp>
+      <p:sp>
+        <p:nvSpPr>
+          <p:cNvPr id="16" name="TextBox 15">
+            <a:extLst>
+              <a:ext uri="{FF2B5EF4-FFF2-40B4-BE49-F238E27FC236}">
+                <a16:creationId xmlns:a16="http://schemas.microsoft.com/office/drawing/2014/main" id="{9F3FD84D-4239-472C-A305-2600986C6587}"/>
+              </a:ext>
+            </a:extLst>
+          </p:cNvPr>
+          <p:cNvSpPr txBox="1"/>
+          <p:nvPr/>
+        </p:nvSpPr>
+        <p:spPr>
+          <a:xfrm>
+            <a:off x="2670837" y="728304"/>
+            <a:ext cx="2350233" cy="369332"/>
+          </a:xfrm>
+          <a:prstGeom prst="rect">
+            <a:avLst/>
+          </a:prstGeom>
+        </p:spPr>
+        <p:style>
+          <a:lnRef idx="0">
+            <a:schemeClr val="accent5"/>
+          </a:lnRef>
+          <a:fillRef idx="3">
+            <a:schemeClr val="accent5"/>
+          </a:fillRef>
+          <a:effectRef idx="3">
+            <a:schemeClr val="accent5"/>
+          </a:effectRef>
+          <a:fontRef idx="minor">
+            <a:schemeClr val="lt1"/>
+          </a:fontRef>
+        </p:style>
+        <p:txBody>
+          <a:bodyPr wrap="square" rtlCol="0">
+            <a:noAutofit/>
+          </a:bodyPr>
+          <a:lstStyle/>
+          <a:p>
+            <a:pPr algn="ctr"/>
+            <a:r>
+              <a:rPr lang="en-US" b="1" dirty="0"/>
+              <a:t>ACCOUNT LEVEL [0..n]</a:t>
+            </a:r>
+          </a:p>
+        </p:txBody>
+      </p:sp>
+      <p:sp>
+        <p:nvSpPr>
+          <p:cNvPr id="22" name="Rectangle 21">
+            <a:extLst>
+              <a:ext uri="{FF2B5EF4-FFF2-40B4-BE49-F238E27FC236}">
+                <a16:creationId xmlns:a16="http://schemas.microsoft.com/office/drawing/2014/main" id="{BCBE485D-229C-44C6-A2A5-577524C62767}"/>
+              </a:ext>
+            </a:extLst>
+          </p:cNvPr>
+          <p:cNvSpPr/>
+          <p:nvPr/>
+        </p:nvSpPr>
+        <p:spPr>
+          <a:xfrm>
+            <a:off x="2521009" y="1480044"/>
+            <a:ext cx="9531705" cy="1948955"/>
+          </a:xfrm>
+          <a:prstGeom prst="rect">
+            <a:avLst/>
+          </a:prstGeom>
+          <a:noFill/>
+          <a:ln w="28575" cap="flat" cmpd="sng" algn="ctr">
+            <a:solidFill>
+              <a:schemeClr val="accent6"/>
+            </a:solidFill>
+            <a:prstDash val="dash"/>
+            <a:round/>
+            <a:headEnd type="none" w="med" len="med"/>
+            <a:tailEnd type="none" w="med" len="med"/>
+          </a:ln>
+        </p:spPr>
+        <p:style>
+          <a:lnRef idx="0">
+            <a:scrgbClr r="0" g="0" b="0"/>
+          </a:lnRef>
+          <a:fillRef idx="0">
+            <a:scrgbClr r="0" g="0" b="0"/>
+          </a:fillRef>
+          <a:effectRef idx="0">
+            <a:scrgbClr r="0" g="0" b="0"/>
+          </a:effectRef>
+          <a:fontRef idx="minor">
+            <a:schemeClr val="accent6"/>
+          </a:fontRef>
+        </p:style>
+        <p:txBody>
+          <a:bodyPr rtlCol="0" anchor="ctr"/>
+          <a:lstStyle/>
+          <a:p>
+            <a:pPr algn="ctr"/>
+            <a:endParaRPr lang="en-US"/>
+          </a:p>
+        </p:txBody>
+      </p:sp>
+      <p:sp>
+        <p:nvSpPr>
+          <p:cNvPr id="52" name="TextBox 51">
+            <a:extLst>
+              <a:ext uri="{FF2B5EF4-FFF2-40B4-BE49-F238E27FC236}">
+                <a16:creationId xmlns:a16="http://schemas.microsoft.com/office/drawing/2014/main" id="{5B9C6D35-227F-4082-AEC7-EBF8D23D4B4E}"/>
+              </a:ext>
+            </a:extLst>
+          </p:cNvPr>
+          <p:cNvSpPr txBox="1"/>
+          <p:nvPr/>
+        </p:nvSpPr>
+        <p:spPr>
+          <a:xfrm>
+            <a:off x="2607974" y="1330672"/>
+            <a:ext cx="2413096" cy="307777"/>
+          </a:xfrm>
+          <a:prstGeom prst="rect">
+            <a:avLst/>
+          </a:prstGeom>
+          <a:solidFill>
+            <a:schemeClr val="bg1"/>
+          </a:solidFill>
+        </p:spPr>
+        <p:txBody>
+          <a:bodyPr wrap="none" rtlCol="0">
+            <a:spAutoFit/>
+          </a:bodyPr>
+          <a:lstStyle/>
+          <a:p>
+            <a:r>
+              <a:rPr lang="en-US" sz="1400" dirty="0">
+                <a:solidFill>
+                  <a:schemeClr val="accent6">
+                    <a:lumMod val="75000"/>
+                  </a:schemeClr>
+                </a:solidFill>
+              </a:rPr>
+              <a:t>Independent address/key pool</a:t>
+            </a:r>
+          </a:p>
+        </p:txBody>
+      </p:sp>
+      <p:cxnSp>
+        <p:nvCxnSpPr>
+          <p:cNvPr id="57" name="Straight Arrow Connector 56">
+            <a:extLst>
+              <a:ext uri="{FF2B5EF4-FFF2-40B4-BE49-F238E27FC236}">
+                <a16:creationId xmlns:a16="http://schemas.microsoft.com/office/drawing/2014/main" id="{C915FE86-360B-4937-AF1A-48D17472C716}"/>
+              </a:ext>
+            </a:extLst>
+          </p:cNvPr>
+          <p:cNvCxnSpPr>
+            <a:cxnSpLocks/>
+            <a:stCxn id="4" idx="3"/>
+            <a:endCxn id="89" idx="1"/>
+          </p:cNvCxnSpPr>
+          <p:nvPr/>
+        </p:nvCxnSpPr>
+        <p:spPr>
+          <a:xfrm>
+            <a:off x="2110598" y="2066189"/>
+            <a:ext cx="560239" cy="185"/>
+          </a:xfrm>
+          <a:prstGeom prst="straightConnector1">
+            <a:avLst/>
+          </a:prstGeom>
+          <a:ln w="19050">
+            <a:solidFill>
+              <a:schemeClr val="bg1">
+                <a:lumMod val="75000"/>
+              </a:schemeClr>
+            </a:solidFill>
+            <a:prstDash val="solid"/>
+            <a:tailEnd type="triangle"/>
+          </a:ln>
+        </p:spPr>
+        <p:style>
+          <a:lnRef idx="1">
+            <a:schemeClr val="accent1"/>
+          </a:lnRef>
+          <a:fillRef idx="0">
+            <a:schemeClr val="accent1"/>
+          </a:fillRef>
+          <a:effectRef idx="0">
+            <a:schemeClr val="accent1"/>
+          </a:effectRef>
+          <a:fontRef idx="minor">
+            <a:schemeClr val="tx1"/>
+          </a:fontRef>
+        </p:style>
+      </p:cxnSp>
+      <p:sp>
+        <p:nvSpPr>
+          <p:cNvPr id="69" name="TextBox 68">
+            <a:extLst>
+              <a:ext uri="{FF2B5EF4-FFF2-40B4-BE49-F238E27FC236}">
+                <a16:creationId xmlns:a16="http://schemas.microsoft.com/office/drawing/2014/main" id="{4A4A3A1E-FEB0-4212-8DF5-0ADDD21CB01A}"/>
+              </a:ext>
+            </a:extLst>
+          </p:cNvPr>
+          <p:cNvSpPr txBox="1"/>
+          <p:nvPr/>
+        </p:nvSpPr>
+        <p:spPr>
+          <a:xfrm>
+            <a:off x="-277586" y="90409"/>
+            <a:ext cx="2805056" cy="276999"/>
+          </a:xfrm>
+          <a:prstGeom prst="rect">
+            <a:avLst/>
+          </a:prstGeom>
+          <a:noFill/>
+        </p:spPr>
+        <p:txBody>
+          <a:bodyPr wrap="square" rtlCol="0">
+            <a:spAutoFit/>
+          </a:bodyPr>
+          <a:lstStyle/>
+          <a:p>
+            <a:pPr algn="ctr"/>
+            <a:r>
+              <a:rPr lang="en-US" sz="1200" i="1" dirty="0">
+                <a:solidFill>
+                  <a:schemeClr val="bg1">
+                    <a:lumMod val="65000"/>
+                  </a:schemeClr>
+                </a:solidFill>
+              </a:rPr>
+              <a:t>HMAC-SHA512</a:t>
+            </a:r>
+          </a:p>
+        </p:txBody>
+      </p:sp>
+      <p:sp>
+        <p:nvSpPr>
+          <p:cNvPr id="71" name="TextBox 70">
+            <a:extLst>
+              <a:ext uri="{FF2B5EF4-FFF2-40B4-BE49-F238E27FC236}">
+                <a16:creationId xmlns:a16="http://schemas.microsoft.com/office/drawing/2014/main" id="{A6BBF3A4-4551-4FEA-BCB5-FEA5175AF441}"/>
+              </a:ext>
+            </a:extLst>
+          </p:cNvPr>
+          <p:cNvSpPr txBox="1"/>
+          <p:nvPr/>
+        </p:nvSpPr>
+        <p:spPr>
+          <a:xfrm>
+            <a:off x="139286" y="5679441"/>
+            <a:ext cx="6359284" cy="954107"/>
+          </a:xfrm>
+          <a:prstGeom prst="rect">
+            <a:avLst/>
+          </a:prstGeom>
+          <a:noFill/>
+        </p:spPr>
+        <p:txBody>
+          <a:bodyPr wrap="square" rtlCol="0">
+            <a:spAutoFit/>
+          </a:bodyPr>
+          <a:lstStyle/>
+          <a:p>
+            <a:r>
+              <a:rPr lang="en-US" sz="2800" b="1" dirty="0"/>
+              <a:t>Generating IOTA addresses</a:t>
+            </a:r>
+            <a:br>
+              <a:rPr lang="en-US" sz="2800" b="1" dirty="0"/>
+            </a:br>
+            <a:r>
+              <a:rPr lang="en-US" sz="2800" b="1" dirty="0"/>
+              <a:t>using derivation path</a:t>
+            </a:r>
+          </a:p>
+        </p:txBody>
+      </p:sp>
+      <p:sp>
+        <p:nvSpPr>
+          <p:cNvPr id="89" name="TextBox 88">
+            <a:extLst>
+              <a:ext uri="{FF2B5EF4-FFF2-40B4-BE49-F238E27FC236}">
+                <a16:creationId xmlns:a16="http://schemas.microsoft.com/office/drawing/2014/main" id="{9DA858BD-25DA-4B14-ACCE-90DE7E968264}"/>
+              </a:ext>
+            </a:extLst>
+          </p:cNvPr>
+          <p:cNvSpPr txBox="1"/>
+          <p:nvPr/>
+        </p:nvSpPr>
+        <p:spPr>
+          <a:xfrm>
+            <a:off x="2670837" y="1881708"/>
+            <a:ext cx="2350233" cy="369332"/>
+          </a:xfrm>
+          <a:prstGeom prst="rect">
+            <a:avLst/>
+          </a:prstGeom>
+        </p:spPr>
+        <p:style>
+          <a:lnRef idx="0">
+            <a:schemeClr val="accent5"/>
+          </a:lnRef>
+          <a:fillRef idx="3">
+            <a:schemeClr val="accent5"/>
+          </a:fillRef>
+          <a:effectRef idx="3">
+            <a:schemeClr val="accent5"/>
+          </a:effectRef>
+          <a:fontRef idx="minor">
+            <a:schemeClr val="lt1"/>
+          </a:fontRef>
+        </p:style>
+        <p:txBody>
+          <a:bodyPr wrap="square" rtlCol="0">
+            <a:noAutofit/>
+          </a:bodyPr>
+          <a:lstStyle/>
+          <a:p>
+            <a:pPr algn="ctr"/>
+            <a:r>
+              <a:rPr lang="en-US" b="1" dirty="0"/>
+              <a:t>Account 0</a:t>
+            </a:r>
+          </a:p>
+        </p:txBody>
+      </p:sp>
+      <p:sp>
+        <p:nvSpPr>
+          <p:cNvPr id="92" name="TextBox 91">
+            <a:extLst>
+              <a:ext uri="{FF2B5EF4-FFF2-40B4-BE49-F238E27FC236}">
+                <a16:creationId xmlns:a16="http://schemas.microsoft.com/office/drawing/2014/main" id="{51E1B215-1FA5-433C-B089-3972734234F9}"/>
+              </a:ext>
+            </a:extLst>
+          </p:cNvPr>
+          <p:cNvSpPr txBox="1"/>
+          <p:nvPr/>
+        </p:nvSpPr>
+        <p:spPr>
+          <a:xfrm>
+            <a:off x="5443960" y="1881708"/>
+            <a:ext cx="2020903" cy="369332"/>
+          </a:xfrm>
+          <a:prstGeom prst="rect">
+            <a:avLst/>
+          </a:prstGeom>
+          <a:ln/>
+        </p:spPr>
+        <p:style>
+          <a:lnRef idx="0">
+            <a:schemeClr val="accent3"/>
+          </a:lnRef>
+          <a:fillRef idx="3">
+            <a:schemeClr val="accent3"/>
+          </a:fillRef>
+          <a:effectRef idx="3">
+            <a:schemeClr val="accent3"/>
+          </a:effectRef>
+          <a:fontRef idx="minor">
+            <a:schemeClr val="lt1"/>
+          </a:fontRef>
+        </p:style>
+        <p:txBody>
+          <a:bodyPr wrap="square" rtlCol="0">
+            <a:noAutofit/>
+          </a:bodyPr>
+          <a:lstStyle/>
+          <a:p>
+            <a:pPr algn="ctr"/>
+            <a:r>
+              <a:rPr lang="en-US" b="1" dirty="0"/>
+              <a:t>Chain = 0</a:t>
+            </a:r>
+          </a:p>
+        </p:txBody>
+      </p:sp>
+      <p:sp>
+        <p:nvSpPr>
+          <p:cNvPr id="93" name="TextBox 92">
+            <a:extLst>
+              <a:ext uri="{FF2B5EF4-FFF2-40B4-BE49-F238E27FC236}">
+                <a16:creationId xmlns:a16="http://schemas.microsoft.com/office/drawing/2014/main" id="{1075DCCC-2FAA-4462-8EAC-80313C1371CE}"/>
+              </a:ext>
+            </a:extLst>
+          </p:cNvPr>
+          <p:cNvSpPr txBox="1"/>
+          <p:nvPr/>
+        </p:nvSpPr>
+        <p:spPr>
+          <a:xfrm>
+            <a:off x="5443961" y="2671831"/>
+            <a:ext cx="2020902" cy="369332"/>
+          </a:xfrm>
+          <a:prstGeom prst="rect">
+            <a:avLst/>
+          </a:prstGeom>
+          <a:ln/>
+        </p:spPr>
+        <p:style>
+          <a:lnRef idx="0">
+            <a:schemeClr val="accent3"/>
+          </a:lnRef>
+          <a:fillRef idx="3">
+            <a:schemeClr val="accent3"/>
+          </a:fillRef>
+          <a:effectRef idx="3">
+            <a:schemeClr val="accent3"/>
+          </a:effectRef>
+          <a:fontRef idx="minor">
+            <a:schemeClr val="lt1"/>
+          </a:fontRef>
+        </p:style>
+        <p:txBody>
+          <a:bodyPr wrap="square" rtlCol="0">
+            <a:noAutofit/>
+          </a:bodyPr>
+          <a:lstStyle/>
+          <a:p>
+            <a:pPr algn="ctr"/>
+            <a:r>
+              <a:rPr lang="en-US" b="1" dirty="0"/>
+              <a:t>Chain = 1</a:t>
+            </a:r>
+          </a:p>
+        </p:txBody>
+      </p:sp>
+      <p:sp>
+        <p:nvSpPr>
+          <p:cNvPr id="94" name="TextBox 93">
+            <a:extLst>
+              <a:ext uri="{FF2B5EF4-FFF2-40B4-BE49-F238E27FC236}">
+                <a16:creationId xmlns:a16="http://schemas.microsoft.com/office/drawing/2014/main" id="{E208A585-FFA6-4E6D-A362-5EBC2E943CA8}"/>
+              </a:ext>
+            </a:extLst>
+          </p:cNvPr>
+          <p:cNvSpPr txBox="1"/>
+          <p:nvPr/>
+        </p:nvSpPr>
+        <p:spPr>
+          <a:xfrm>
+            <a:off x="9349049" y="1881522"/>
+            <a:ext cx="1071883" cy="369332"/>
+          </a:xfrm>
+          <a:prstGeom prst="rect">
+            <a:avLst/>
+          </a:prstGeom>
+        </p:spPr>
+        <p:style>
+          <a:lnRef idx="0">
+            <a:schemeClr val="accent2"/>
+          </a:lnRef>
+          <a:fillRef idx="3">
+            <a:schemeClr val="accent2"/>
+          </a:fillRef>
+          <a:effectRef idx="3">
+            <a:schemeClr val="accent2"/>
+          </a:effectRef>
+          <a:fontRef idx="minor">
+            <a:schemeClr val="lt1"/>
+          </a:fontRef>
+        </p:style>
+        <p:txBody>
+          <a:bodyPr wrap="square" rtlCol="0">
+            <a:noAutofit/>
+          </a:bodyPr>
+          <a:lstStyle/>
+          <a:p>
+            <a:pPr algn="ctr"/>
+            <a:r>
+              <a:rPr lang="en-US" b="1" dirty="0" err="1"/>
+              <a:t>Adr</a:t>
+            </a:r>
+            <a:r>
+              <a:rPr lang="en-US" b="1" dirty="0"/>
+              <a:t> 1</a:t>
+            </a:r>
+          </a:p>
+        </p:txBody>
+      </p:sp>
+      <p:sp>
+        <p:nvSpPr>
+          <p:cNvPr id="95" name="TextBox 94">
+            <a:extLst>
+              <a:ext uri="{FF2B5EF4-FFF2-40B4-BE49-F238E27FC236}">
+                <a16:creationId xmlns:a16="http://schemas.microsoft.com/office/drawing/2014/main" id="{30F19F5F-3887-429D-88CA-C37A91D9CDE1}"/>
+              </a:ext>
+            </a:extLst>
+          </p:cNvPr>
+          <p:cNvSpPr txBox="1"/>
+          <p:nvPr/>
+        </p:nvSpPr>
+        <p:spPr>
+          <a:xfrm>
+            <a:off x="10798225" y="1881522"/>
+            <a:ext cx="1071883" cy="369332"/>
+          </a:xfrm>
+          <a:prstGeom prst="rect">
+            <a:avLst/>
+          </a:prstGeom>
+        </p:spPr>
+        <p:style>
+          <a:lnRef idx="0">
+            <a:schemeClr val="accent2"/>
+          </a:lnRef>
+          <a:fillRef idx="3">
+            <a:schemeClr val="accent2"/>
+          </a:fillRef>
+          <a:effectRef idx="3">
+            <a:schemeClr val="accent2"/>
+          </a:effectRef>
+          <a:fontRef idx="minor">
+            <a:schemeClr val="lt1"/>
+          </a:fontRef>
+        </p:style>
+        <p:txBody>
+          <a:bodyPr wrap="square" rtlCol="0">
+            <a:noAutofit/>
+          </a:bodyPr>
+          <a:lstStyle/>
+          <a:p>
+            <a:pPr algn="ctr"/>
+            <a:r>
+              <a:rPr lang="en-US" b="1" dirty="0" err="1"/>
+              <a:t>Adr</a:t>
+            </a:r>
+            <a:r>
+              <a:rPr lang="en-US" b="1" dirty="0"/>
+              <a:t> ..n</a:t>
+            </a:r>
+          </a:p>
+        </p:txBody>
+      </p:sp>
+      <p:sp>
+        <p:nvSpPr>
+          <p:cNvPr id="96" name="TextBox 95">
+            <a:extLst>
+              <a:ext uri="{FF2B5EF4-FFF2-40B4-BE49-F238E27FC236}">
+                <a16:creationId xmlns:a16="http://schemas.microsoft.com/office/drawing/2014/main" id="{C721FBBD-9412-4F18-A766-B1CCA551B4ED}"/>
+              </a:ext>
+            </a:extLst>
+          </p:cNvPr>
+          <p:cNvSpPr txBox="1"/>
+          <p:nvPr/>
+        </p:nvSpPr>
+        <p:spPr>
+          <a:xfrm>
+            <a:off x="8021712" y="2671831"/>
+            <a:ext cx="1071883" cy="369332"/>
+          </a:xfrm>
+          <a:prstGeom prst="rect">
+            <a:avLst/>
+          </a:prstGeom>
+        </p:spPr>
+        <p:style>
+          <a:lnRef idx="0">
+            <a:schemeClr val="accent2"/>
+          </a:lnRef>
+          <a:fillRef idx="3">
+            <a:schemeClr val="accent2"/>
+          </a:fillRef>
+          <a:effectRef idx="3">
+            <a:schemeClr val="accent2"/>
+          </a:effectRef>
+          <a:fontRef idx="minor">
+            <a:schemeClr val="lt1"/>
+          </a:fontRef>
+        </p:style>
+        <p:txBody>
+          <a:bodyPr wrap="square" rtlCol="0">
+            <a:noAutofit/>
+          </a:bodyPr>
+          <a:lstStyle/>
+          <a:p>
+            <a:pPr algn="ctr"/>
+            <a:r>
+              <a:rPr lang="en-US" b="1" dirty="0" err="1"/>
+              <a:t>Adr</a:t>
+            </a:r>
+            <a:r>
+              <a:rPr lang="en-US" b="1" dirty="0"/>
+              <a:t> 0</a:t>
+            </a:r>
+          </a:p>
+        </p:txBody>
+      </p:sp>
+      <p:sp>
+        <p:nvSpPr>
+          <p:cNvPr id="97" name="TextBox 96">
+            <a:extLst>
+              <a:ext uri="{FF2B5EF4-FFF2-40B4-BE49-F238E27FC236}">
+                <a16:creationId xmlns:a16="http://schemas.microsoft.com/office/drawing/2014/main" id="{6CDE8824-A699-42E1-9E18-8DFF5A09E483}"/>
+              </a:ext>
+            </a:extLst>
+          </p:cNvPr>
+          <p:cNvSpPr txBox="1"/>
+          <p:nvPr/>
+        </p:nvSpPr>
+        <p:spPr>
+          <a:xfrm>
+            <a:off x="9349049" y="2671831"/>
+            <a:ext cx="1071883" cy="369332"/>
+          </a:xfrm>
+          <a:prstGeom prst="rect">
+            <a:avLst/>
+          </a:prstGeom>
+        </p:spPr>
+        <p:style>
+          <a:lnRef idx="0">
+            <a:schemeClr val="accent2"/>
+          </a:lnRef>
+          <a:fillRef idx="3">
+            <a:schemeClr val="accent2"/>
+          </a:fillRef>
+          <a:effectRef idx="3">
+            <a:schemeClr val="accent2"/>
+          </a:effectRef>
+          <a:fontRef idx="minor">
+            <a:schemeClr val="lt1"/>
+          </a:fontRef>
+        </p:style>
+        <p:txBody>
+          <a:bodyPr wrap="square" rtlCol="0">
+            <a:noAutofit/>
+          </a:bodyPr>
+          <a:lstStyle/>
+          <a:p>
+            <a:pPr algn="ctr"/>
+            <a:r>
+              <a:rPr lang="en-US" b="1" dirty="0" err="1"/>
+              <a:t>Adr</a:t>
+            </a:r>
+            <a:r>
+              <a:rPr lang="en-US" b="1" dirty="0"/>
+              <a:t> 1</a:t>
+            </a:r>
+          </a:p>
+        </p:txBody>
+      </p:sp>
+      <p:sp>
+        <p:nvSpPr>
+          <p:cNvPr id="98" name="TextBox 97">
+            <a:extLst>
+              <a:ext uri="{FF2B5EF4-FFF2-40B4-BE49-F238E27FC236}">
+                <a16:creationId xmlns:a16="http://schemas.microsoft.com/office/drawing/2014/main" id="{BF7036A0-BB43-4072-BDDF-7C0CFE495A6D}"/>
+              </a:ext>
+            </a:extLst>
+          </p:cNvPr>
+          <p:cNvSpPr txBox="1"/>
+          <p:nvPr/>
+        </p:nvSpPr>
+        <p:spPr>
+          <a:xfrm>
+            <a:off x="10798225" y="2671831"/>
+            <a:ext cx="1071883" cy="369332"/>
+          </a:xfrm>
+          <a:prstGeom prst="rect">
+            <a:avLst/>
+          </a:prstGeom>
+        </p:spPr>
+        <p:style>
+          <a:lnRef idx="0">
+            <a:schemeClr val="accent2"/>
+          </a:lnRef>
+          <a:fillRef idx="3">
+            <a:schemeClr val="accent2"/>
+          </a:fillRef>
+          <a:effectRef idx="3">
+            <a:schemeClr val="accent2"/>
+          </a:effectRef>
+          <a:fontRef idx="minor">
+            <a:schemeClr val="lt1"/>
+          </a:fontRef>
+        </p:style>
+        <p:txBody>
+          <a:bodyPr wrap="square" rtlCol="0">
+            <a:noAutofit/>
+          </a:bodyPr>
+          <a:lstStyle/>
+          <a:p>
+            <a:pPr algn="ctr"/>
+            <a:r>
+              <a:rPr lang="en-US" b="1" dirty="0" err="1"/>
+              <a:t>Adr</a:t>
+            </a:r>
+            <a:r>
+              <a:rPr lang="en-US" b="1" dirty="0"/>
+              <a:t> ..n</a:t>
+            </a:r>
+          </a:p>
+        </p:txBody>
+      </p:sp>
+      <p:sp>
+        <p:nvSpPr>
+          <p:cNvPr id="101" name="Rectangle 100">
+            <a:extLst>
+              <a:ext uri="{FF2B5EF4-FFF2-40B4-BE49-F238E27FC236}">
+                <a16:creationId xmlns:a16="http://schemas.microsoft.com/office/drawing/2014/main" id="{E2D8CDBA-39B7-49F8-8A08-76AE3D903DAB}"/>
+              </a:ext>
+            </a:extLst>
+          </p:cNvPr>
+          <p:cNvSpPr/>
+          <p:nvPr/>
+        </p:nvSpPr>
+        <p:spPr>
+          <a:xfrm>
+            <a:off x="5341121" y="1741935"/>
+            <a:ext cx="6605900" cy="605612"/>
+          </a:xfrm>
+          <a:prstGeom prst="rect">
+            <a:avLst/>
+          </a:prstGeom>
+          <a:noFill/>
+          <a:ln w="19050" cap="flat" cmpd="sng" algn="ctr">
+            <a:solidFill>
+              <a:schemeClr val="bg1">
+                <a:lumMod val="85000"/>
+              </a:schemeClr>
+            </a:solidFill>
+            <a:prstDash val="sysDot"/>
+            <a:round/>
+            <a:headEnd type="none" w="med" len="med"/>
+            <a:tailEnd type="none" w="med" len="med"/>
+          </a:ln>
+        </p:spPr>
+        <p:style>
+          <a:lnRef idx="0">
+            <a:scrgbClr r="0" g="0" b="0"/>
+          </a:lnRef>
+          <a:fillRef idx="0">
+            <a:scrgbClr r="0" g="0" b="0"/>
+          </a:fillRef>
+          <a:effectRef idx="0">
+            <a:scrgbClr r="0" g="0" b="0"/>
+          </a:effectRef>
+          <a:fontRef idx="minor">
+            <a:schemeClr val="accent6"/>
+          </a:fontRef>
+        </p:style>
+        <p:txBody>
+          <a:bodyPr rtlCol="0" anchor="ctr"/>
+          <a:lstStyle/>
+          <a:p>
+            <a:pPr algn="ctr"/>
+            <a:endParaRPr lang="en-US"/>
+          </a:p>
+        </p:txBody>
+      </p:sp>
+      <p:sp>
+        <p:nvSpPr>
+          <p:cNvPr id="102" name="Rectangle 101">
+            <a:extLst>
+              <a:ext uri="{FF2B5EF4-FFF2-40B4-BE49-F238E27FC236}">
+                <a16:creationId xmlns:a16="http://schemas.microsoft.com/office/drawing/2014/main" id="{A3B99487-1381-406E-8E8A-651C09EF5453}"/>
+              </a:ext>
+            </a:extLst>
+          </p:cNvPr>
+          <p:cNvSpPr/>
+          <p:nvPr/>
+        </p:nvSpPr>
+        <p:spPr>
+          <a:xfrm>
+            <a:off x="5341121" y="2526525"/>
+            <a:ext cx="6605900" cy="605612"/>
+          </a:xfrm>
+          <a:prstGeom prst="rect">
+            <a:avLst/>
+          </a:prstGeom>
+          <a:noFill/>
+          <a:ln w="19050" cap="flat" cmpd="sng" algn="ctr">
+            <a:solidFill>
+              <a:schemeClr val="bg1">
+                <a:lumMod val="85000"/>
+              </a:schemeClr>
+            </a:solidFill>
+            <a:prstDash val="sysDot"/>
+            <a:round/>
+            <a:headEnd type="none" w="med" len="med"/>
+            <a:tailEnd type="none" w="med" len="med"/>
+          </a:ln>
+        </p:spPr>
+        <p:style>
+          <a:lnRef idx="0">
+            <a:scrgbClr r="0" g="0" b="0"/>
+          </a:lnRef>
+          <a:fillRef idx="0">
+            <a:scrgbClr r="0" g="0" b="0"/>
+          </a:fillRef>
+          <a:effectRef idx="0">
+            <a:scrgbClr r="0" g="0" b="0"/>
+          </a:effectRef>
+          <a:fontRef idx="minor">
+            <a:schemeClr val="accent6"/>
+          </a:fontRef>
+        </p:style>
+        <p:txBody>
+          <a:bodyPr rtlCol="0" anchor="ctr"/>
+          <a:lstStyle/>
+          <a:p>
+            <a:pPr algn="ctr"/>
+            <a:endParaRPr lang="en-US"/>
+          </a:p>
+        </p:txBody>
+      </p:sp>
+      <p:sp>
+        <p:nvSpPr>
+          <p:cNvPr id="103" name="TextBox 102">
+            <a:extLst>
+              <a:ext uri="{FF2B5EF4-FFF2-40B4-BE49-F238E27FC236}">
+                <a16:creationId xmlns:a16="http://schemas.microsoft.com/office/drawing/2014/main" id="{53397D7C-924A-4E80-BABE-5F4A33743459}"/>
+              </a:ext>
+            </a:extLst>
+          </p:cNvPr>
+          <p:cNvSpPr txBox="1"/>
+          <p:nvPr/>
+        </p:nvSpPr>
+        <p:spPr>
+          <a:xfrm>
+            <a:off x="5389153" y="1601092"/>
+            <a:ext cx="1935145" cy="261610"/>
+          </a:xfrm>
+          <a:prstGeom prst="rect">
+            <a:avLst/>
+          </a:prstGeom>
+          <a:solidFill>
+            <a:schemeClr val="bg1"/>
+          </a:solidFill>
+        </p:spPr>
+        <p:txBody>
+          <a:bodyPr wrap="none" rtlCol="0">
+            <a:spAutoFit/>
+          </a:bodyPr>
+          <a:lstStyle/>
+          <a:p>
+            <a:r>
+              <a:rPr lang="en-US" sz="1100" i="1" dirty="0">
+                <a:solidFill>
+                  <a:schemeClr val="accent6">
+                    <a:lumMod val="75000"/>
+                  </a:schemeClr>
+                </a:solidFill>
+              </a:rPr>
+              <a:t>Independent address/key pool</a:t>
+            </a:r>
+          </a:p>
+        </p:txBody>
+      </p:sp>
+      <p:sp>
+        <p:nvSpPr>
+          <p:cNvPr id="104" name="TextBox 103">
+            <a:extLst>
+              <a:ext uri="{FF2B5EF4-FFF2-40B4-BE49-F238E27FC236}">
+                <a16:creationId xmlns:a16="http://schemas.microsoft.com/office/drawing/2014/main" id="{A85EFB45-B636-4947-A1A2-0AC76A0D617C}"/>
+              </a:ext>
+            </a:extLst>
+          </p:cNvPr>
+          <p:cNvSpPr txBox="1"/>
+          <p:nvPr/>
+        </p:nvSpPr>
+        <p:spPr>
+          <a:xfrm>
+            <a:off x="5389153" y="2395089"/>
+            <a:ext cx="1935145" cy="261610"/>
+          </a:xfrm>
+          <a:prstGeom prst="rect">
+            <a:avLst/>
+          </a:prstGeom>
+          <a:solidFill>
+            <a:schemeClr val="bg1"/>
+          </a:solidFill>
+        </p:spPr>
+        <p:txBody>
+          <a:bodyPr wrap="none" rtlCol="0">
+            <a:spAutoFit/>
+          </a:bodyPr>
+          <a:lstStyle/>
+          <a:p>
+            <a:r>
+              <a:rPr lang="en-US" sz="1100" i="1" dirty="0">
+                <a:solidFill>
+                  <a:schemeClr val="accent6">
+                    <a:lumMod val="75000"/>
+                  </a:schemeClr>
+                </a:solidFill>
+              </a:rPr>
+              <a:t>Independent address/key pool</a:t>
+            </a:r>
+          </a:p>
+        </p:txBody>
+      </p:sp>
+      <p:sp>
+        <p:nvSpPr>
+          <p:cNvPr id="105" name="TextBox 104">
+            <a:extLst>
+              <a:ext uri="{FF2B5EF4-FFF2-40B4-BE49-F238E27FC236}">
+                <a16:creationId xmlns:a16="http://schemas.microsoft.com/office/drawing/2014/main" id="{E8961D3D-BBE1-49CC-8386-CE8BFF1C3B19}"/>
+              </a:ext>
+            </a:extLst>
+          </p:cNvPr>
+          <p:cNvSpPr txBox="1"/>
+          <p:nvPr/>
+        </p:nvSpPr>
+        <p:spPr>
+          <a:xfrm>
+            <a:off x="139286" y="728305"/>
+            <a:ext cx="1974702" cy="369332"/>
+          </a:xfrm>
+          <a:prstGeom prst="rect">
+            <a:avLst/>
+          </a:prstGeom>
+        </p:spPr>
+        <p:style>
+          <a:lnRef idx="0">
+            <a:schemeClr val="accent4"/>
+          </a:lnRef>
+          <a:fillRef idx="3">
+            <a:schemeClr val="accent4"/>
+          </a:fillRef>
+          <a:effectRef idx="3">
+            <a:schemeClr val="accent4"/>
+          </a:effectRef>
+          <a:fontRef idx="minor">
+            <a:schemeClr val="lt1"/>
+          </a:fontRef>
+        </p:style>
+        <p:txBody>
+          <a:bodyPr wrap="square" rtlCol="0">
+            <a:noAutofit/>
+          </a:bodyPr>
+          <a:lstStyle/>
+          <a:p>
+            <a:pPr algn="ctr"/>
+            <a:r>
+              <a:rPr lang="en-US" b="1" dirty="0"/>
+              <a:t>Root </a:t>
+            </a:r>
+            <a:r>
+              <a:rPr lang="en-US" sz="1600" b="1" dirty="0"/>
+              <a:t>(seed-based)</a:t>
+            </a:r>
+            <a:endParaRPr lang="en-US" b="1" dirty="0"/>
+          </a:p>
+        </p:txBody>
+      </p:sp>
+      <p:sp>
+        <p:nvSpPr>
+          <p:cNvPr id="106" name="TextBox 105">
+            <a:extLst>
+              <a:ext uri="{FF2B5EF4-FFF2-40B4-BE49-F238E27FC236}">
+                <a16:creationId xmlns:a16="http://schemas.microsoft.com/office/drawing/2014/main" id="{FC3464E8-1CDA-4FBD-92E4-58B63D07AD0F}"/>
+              </a:ext>
+            </a:extLst>
+          </p:cNvPr>
+          <p:cNvSpPr txBox="1"/>
+          <p:nvPr/>
+        </p:nvSpPr>
+        <p:spPr>
+          <a:xfrm>
+            <a:off x="8021712" y="3980474"/>
+            <a:ext cx="1071883" cy="369332"/>
+          </a:xfrm>
+          <a:prstGeom prst="rect">
+            <a:avLst/>
+          </a:prstGeom>
+        </p:spPr>
+        <p:style>
+          <a:lnRef idx="0">
+            <a:schemeClr val="accent2"/>
+          </a:lnRef>
+          <a:fillRef idx="3">
+            <a:schemeClr val="accent2"/>
+          </a:fillRef>
+          <a:effectRef idx="3">
+            <a:schemeClr val="accent2"/>
+          </a:effectRef>
+          <a:fontRef idx="minor">
+            <a:schemeClr val="lt1"/>
+          </a:fontRef>
+        </p:style>
+        <p:txBody>
+          <a:bodyPr wrap="square" rtlCol="0">
+            <a:noAutofit/>
+          </a:bodyPr>
+          <a:lstStyle/>
+          <a:p>
+            <a:pPr algn="ctr"/>
+            <a:r>
+              <a:rPr lang="en-US" b="1" dirty="0" err="1"/>
+              <a:t>Adr</a:t>
+            </a:r>
+            <a:r>
+              <a:rPr lang="en-US" b="1" dirty="0"/>
+              <a:t> 0</a:t>
+            </a:r>
+          </a:p>
+        </p:txBody>
+      </p:sp>
+      <p:sp>
+        <p:nvSpPr>
+          <p:cNvPr id="107" name="Rectangle 106">
+            <a:extLst>
+              <a:ext uri="{FF2B5EF4-FFF2-40B4-BE49-F238E27FC236}">
+                <a16:creationId xmlns:a16="http://schemas.microsoft.com/office/drawing/2014/main" id="{88979301-52FD-458E-9807-6D7CCE2B1EAF}"/>
+              </a:ext>
+            </a:extLst>
+          </p:cNvPr>
+          <p:cNvSpPr/>
+          <p:nvPr/>
+        </p:nvSpPr>
+        <p:spPr>
+          <a:xfrm>
+            <a:off x="2521009" y="3690889"/>
+            <a:ext cx="9531705" cy="1687067"/>
+          </a:xfrm>
+          <a:prstGeom prst="rect">
+            <a:avLst/>
+          </a:prstGeom>
+          <a:noFill/>
+          <a:ln w="28575" cap="flat" cmpd="sng" algn="ctr">
+            <a:solidFill>
+              <a:schemeClr val="accent6"/>
+            </a:solidFill>
+            <a:prstDash val="dash"/>
+            <a:round/>
+            <a:headEnd type="none" w="med" len="med"/>
+            <a:tailEnd type="none" w="med" len="med"/>
+          </a:ln>
+        </p:spPr>
+        <p:style>
+          <a:lnRef idx="0">
+            <a:scrgbClr r="0" g="0" b="0"/>
+          </a:lnRef>
+          <a:fillRef idx="0">
+            <a:scrgbClr r="0" g="0" b="0"/>
+          </a:fillRef>
+          <a:effectRef idx="0">
+            <a:scrgbClr r="0" g="0" b="0"/>
+          </a:effectRef>
+          <a:fontRef idx="minor">
+            <a:schemeClr val="accent6"/>
+          </a:fontRef>
+        </p:style>
+        <p:txBody>
+          <a:bodyPr rtlCol="0" anchor="ctr"/>
+          <a:lstStyle/>
+          <a:p>
+            <a:pPr algn="ctr"/>
+            <a:endParaRPr lang="en-US"/>
+          </a:p>
+        </p:txBody>
+      </p:sp>
+      <p:sp>
+        <p:nvSpPr>
+          <p:cNvPr id="109" name="TextBox 108">
+            <a:extLst>
+              <a:ext uri="{FF2B5EF4-FFF2-40B4-BE49-F238E27FC236}">
+                <a16:creationId xmlns:a16="http://schemas.microsoft.com/office/drawing/2014/main" id="{F03A0AD3-3300-43B9-8A0C-77D4A6480C34}"/>
+              </a:ext>
+            </a:extLst>
+          </p:cNvPr>
+          <p:cNvSpPr txBox="1"/>
+          <p:nvPr/>
+        </p:nvSpPr>
+        <p:spPr>
+          <a:xfrm>
+            <a:off x="2670837" y="3980660"/>
+            <a:ext cx="2350233" cy="369332"/>
+          </a:xfrm>
+          <a:prstGeom prst="rect">
+            <a:avLst/>
+          </a:prstGeom>
+        </p:spPr>
+        <p:style>
+          <a:lnRef idx="0">
+            <a:schemeClr val="accent5"/>
+          </a:lnRef>
+          <a:fillRef idx="3">
+            <a:schemeClr val="accent5"/>
+          </a:fillRef>
+          <a:effectRef idx="3">
+            <a:schemeClr val="accent5"/>
+          </a:effectRef>
+          <a:fontRef idx="minor">
+            <a:schemeClr val="lt1"/>
+          </a:fontRef>
+        </p:style>
+        <p:txBody>
+          <a:bodyPr wrap="square" rtlCol="0">
+            <a:noAutofit/>
+          </a:bodyPr>
+          <a:lstStyle/>
+          <a:p>
+            <a:pPr algn="ctr"/>
+            <a:r>
+              <a:rPr lang="en-US" b="1" dirty="0"/>
+              <a:t>Account ..n</a:t>
+            </a:r>
+          </a:p>
+        </p:txBody>
+      </p:sp>
+      <p:sp>
+        <p:nvSpPr>
+          <p:cNvPr id="110" name="TextBox 109">
+            <a:extLst>
+              <a:ext uri="{FF2B5EF4-FFF2-40B4-BE49-F238E27FC236}">
+                <a16:creationId xmlns:a16="http://schemas.microsoft.com/office/drawing/2014/main" id="{53EBA342-79E4-488B-9D01-F1F5A473FFC7}"/>
+              </a:ext>
+            </a:extLst>
+          </p:cNvPr>
+          <p:cNvSpPr txBox="1"/>
+          <p:nvPr/>
+        </p:nvSpPr>
+        <p:spPr>
+          <a:xfrm>
+            <a:off x="5443960" y="3980660"/>
+            <a:ext cx="2020903" cy="369332"/>
+          </a:xfrm>
+          <a:prstGeom prst="rect">
+            <a:avLst/>
+          </a:prstGeom>
+          <a:ln/>
+        </p:spPr>
+        <p:style>
+          <a:lnRef idx="0">
+            <a:schemeClr val="accent3"/>
+          </a:lnRef>
+          <a:fillRef idx="3">
+            <a:schemeClr val="accent3"/>
+          </a:fillRef>
+          <a:effectRef idx="3">
+            <a:schemeClr val="accent3"/>
+          </a:effectRef>
+          <a:fontRef idx="minor">
+            <a:schemeClr val="lt1"/>
+          </a:fontRef>
+        </p:style>
+        <p:txBody>
+          <a:bodyPr wrap="square" rtlCol="0">
+            <a:noAutofit/>
+          </a:bodyPr>
+          <a:lstStyle/>
+          <a:p>
+            <a:pPr algn="ctr"/>
+            <a:r>
+              <a:rPr lang="en-US" b="1" dirty="0"/>
+              <a:t>Chain = 0</a:t>
+            </a:r>
+          </a:p>
+        </p:txBody>
+      </p:sp>
+      <p:sp>
+        <p:nvSpPr>
+          <p:cNvPr id="111" name="TextBox 110">
+            <a:extLst>
+              <a:ext uri="{FF2B5EF4-FFF2-40B4-BE49-F238E27FC236}">
+                <a16:creationId xmlns:a16="http://schemas.microsoft.com/office/drawing/2014/main" id="{1F407225-A64E-41EA-892F-D2B8F6A661E4}"/>
+              </a:ext>
+            </a:extLst>
+          </p:cNvPr>
+          <p:cNvSpPr txBox="1"/>
+          <p:nvPr/>
+        </p:nvSpPr>
+        <p:spPr>
+          <a:xfrm>
+            <a:off x="5443961" y="4770783"/>
+            <a:ext cx="2020902" cy="369332"/>
+          </a:xfrm>
+          <a:prstGeom prst="rect">
+            <a:avLst/>
+          </a:prstGeom>
+          <a:ln/>
+        </p:spPr>
+        <p:style>
+          <a:lnRef idx="0">
+            <a:schemeClr val="accent3"/>
+          </a:lnRef>
+          <a:fillRef idx="3">
+            <a:schemeClr val="accent3"/>
+          </a:fillRef>
+          <a:effectRef idx="3">
+            <a:schemeClr val="accent3"/>
+          </a:effectRef>
+          <a:fontRef idx="minor">
+            <a:schemeClr val="lt1"/>
+          </a:fontRef>
+        </p:style>
+        <p:txBody>
+          <a:bodyPr wrap="square" rtlCol="0">
+            <a:noAutofit/>
+          </a:bodyPr>
+          <a:lstStyle/>
+          <a:p>
+            <a:pPr algn="ctr"/>
+            <a:r>
+              <a:rPr lang="en-US" b="1" dirty="0"/>
+              <a:t>Chain = 1</a:t>
+            </a:r>
+          </a:p>
+        </p:txBody>
+      </p:sp>
+      <p:sp>
+        <p:nvSpPr>
+          <p:cNvPr id="112" name="TextBox 111">
+            <a:extLst>
+              <a:ext uri="{FF2B5EF4-FFF2-40B4-BE49-F238E27FC236}">
+                <a16:creationId xmlns:a16="http://schemas.microsoft.com/office/drawing/2014/main" id="{049EE8F1-4AB9-4CA5-BA24-B1A55982ADC3}"/>
+              </a:ext>
+            </a:extLst>
+          </p:cNvPr>
+          <p:cNvSpPr txBox="1"/>
+          <p:nvPr/>
+        </p:nvSpPr>
+        <p:spPr>
+          <a:xfrm>
+            <a:off x="9349049" y="3980474"/>
+            <a:ext cx="1071883" cy="369332"/>
+          </a:xfrm>
+          <a:prstGeom prst="rect">
+            <a:avLst/>
+          </a:prstGeom>
+        </p:spPr>
+        <p:style>
+          <a:lnRef idx="0">
+            <a:schemeClr val="accent2"/>
+          </a:lnRef>
+          <a:fillRef idx="3">
+            <a:schemeClr val="accent2"/>
+          </a:fillRef>
+          <a:effectRef idx="3">
+            <a:schemeClr val="accent2"/>
+          </a:effectRef>
+          <a:fontRef idx="minor">
+            <a:schemeClr val="lt1"/>
+          </a:fontRef>
+        </p:style>
+        <p:txBody>
+          <a:bodyPr wrap="square" rtlCol="0">
+            <a:noAutofit/>
+          </a:bodyPr>
+          <a:lstStyle/>
+          <a:p>
+            <a:pPr algn="ctr"/>
+            <a:r>
+              <a:rPr lang="en-US" b="1" dirty="0" err="1"/>
+              <a:t>Adr</a:t>
+            </a:r>
+            <a:r>
+              <a:rPr lang="en-US" b="1" dirty="0"/>
+              <a:t> 1</a:t>
+            </a:r>
+          </a:p>
+        </p:txBody>
+      </p:sp>
+      <p:sp>
+        <p:nvSpPr>
+          <p:cNvPr id="113" name="TextBox 112">
+            <a:extLst>
+              <a:ext uri="{FF2B5EF4-FFF2-40B4-BE49-F238E27FC236}">
+                <a16:creationId xmlns:a16="http://schemas.microsoft.com/office/drawing/2014/main" id="{0E3DE2B6-5288-4B00-AEC4-A4C3721FE5A6}"/>
+              </a:ext>
+            </a:extLst>
+          </p:cNvPr>
+          <p:cNvSpPr txBox="1"/>
+          <p:nvPr/>
+        </p:nvSpPr>
+        <p:spPr>
+          <a:xfrm>
+            <a:off x="10798225" y="3980474"/>
+            <a:ext cx="1071883" cy="369332"/>
+          </a:xfrm>
+          <a:prstGeom prst="rect">
+            <a:avLst/>
+          </a:prstGeom>
+        </p:spPr>
+        <p:style>
+          <a:lnRef idx="0">
+            <a:schemeClr val="accent2"/>
+          </a:lnRef>
+          <a:fillRef idx="3">
+            <a:schemeClr val="accent2"/>
+          </a:fillRef>
+          <a:effectRef idx="3">
+            <a:schemeClr val="accent2"/>
+          </a:effectRef>
+          <a:fontRef idx="minor">
+            <a:schemeClr val="lt1"/>
+          </a:fontRef>
+        </p:style>
+        <p:txBody>
+          <a:bodyPr wrap="square" rtlCol="0">
+            <a:noAutofit/>
+          </a:bodyPr>
+          <a:lstStyle/>
+          <a:p>
+            <a:pPr algn="ctr"/>
+            <a:r>
+              <a:rPr lang="en-US" b="1" dirty="0" err="1"/>
+              <a:t>Adr</a:t>
+            </a:r>
+            <a:r>
+              <a:rPr lang="en-US" b="1" dirty="0"/>
+              <a:t> ..n</a:t>
+            </a:r>
+          </a:p>
+        </p:txBody>
+      </p:sp>
+      <p:sp>
+        <p:nvSpPr>
+          <p:cNvPr id="114" name="TextBox 113">
+            <a:extLst>
+              <a:ext uri="{FF2B5EF4-FFF2-40B4-BE49-F238E27FC236}">
+                <a16:creationId xmlns:a16="http://schemas.microsoft.com/office/drawing/2014/main" id="{F9A65B70-2618-433A-9D85-29C08F65AAF5}"/>
+              </a:ext>
+            </a:extLst>
+          </p:cNvPr>
+          <p:cNvSpPr txBox="1"/>
+          <p:nvPr/>
+        </p:nvSpPr>
+        <p:spPr>
+          <a:xfrm>
+            <a:off x="8021712" y="4770783"/>
+            <a:ext cx="1071883" cy="369332"/>
+          </a:xfrm>
+          <a:prstGeom prst="rect">
+            <a:avLst/>
+          </a:prstGeom>
+        </p:spPr>
+        <p:style>
+          <a:lnRef idx="0">
+            <a:schemeClr val="accent2"/>
+          </a:lnRef>
+          <a:fillRef idx="3">
+            <a:schemeClr val="accent2"/>
+          </a:fillRef>
+          <a:effectRef idx="3">
+            <a:schemeClr val="accent2"/>
+          </a:effectRef>
+          <a:fontRef idx="minor">
+            <a:schemeClr val="lt1"/>
+          </a:fontRef>
+        </p:style>
+        <p:txBody>
+          <a:bodyPr wrap="square" rtlCol="0">
+            <a:noAutofit/>
+          </a:bodyPr>
+          <a:lstStyle/>
+          <a:p>
+            <a:pPr algn="ctr"/>
+            <a:r>
+              <a:rPr lang="en-US" b="1" dirty="0" err="1"/>
+              <a:t>Adr</a:t>
+            </a:r>
+            <a:r>
+              <a:rPr lang="en-US" b="1" dirty="0"/>
+              <a:t> 0</a:t>
+            </a:r>
+          </a:p>
+        </p:txBody>
+      </p:sp>
+      <p:sp>
+        <p:nvSpPr>
+          <p:cNvPr id="115" name="TextBox 114">
+            <a:extLst>
+              <a:ext uri="{FF2B5EF4-FFF2-40B4-BE49-F238E27FC236}">
+                <a16:creationId xmlns:a16="http://schemas.microsoft.com/office/drawing/2014/main" id="{CE8A5BB9-C6D0-401A-AAC7-A2BD5935BB84}"/>
+              </a:ext>
+            </a:extLst>
+          </p:cNvPr>
+          <p:cNvSpPr txBox="1"/>
+          <p:nvPr/>
+        </p:nvSpPr>
+        <p:spPr>
+          <a:xfrm>
+            <a:off x="9349049" y="4770783"/>
+            <a:ext cx="1071883" cy="369332"/>
+          </a:xfrm>
+          <a:prstGeom prst="rect">
+            <a:avLst/>
+          </a:prstGeom>
+        </p:spPr>
+        <p:style>
+          <a:lnRef idx="0">
+            <a:schemeClr val="accent2"/>
+          </a:lnRef>
+          <a:fillRef idx="3">
+            <a:schemeClr val="accent2"/>
+          </a:fillRef>
+          <a:effectRef idx="3">
+            <a:schemeClr val="accent2"/>
+          </a:effectRef>
+          <a:fontRef idx="minor">
+            <a:schemeClr val="lt1"/>
+          </a:fontRef>
+        </p:style>
+        <p:txBody>
+          <a:bodyPr wrap="square" rtlCol="0">
+            <a:noAutofit/>
+          </a:bodyPr>
+          <a:lstStyle/>
+          <a:p>
+            <a:pPr algn="ctr"/>
+            <a:r>
+              <a:rPr lang="en-US" b="1" dirty="0" err="1"/>
+              <a:t>Adr</a:t>
+            </a:r>
+            <a:r>
+              <a:rPr lang="en-US" b="1" dirty="0"/>
+              <a:t> 1</a:t>
+            </a:r>
+          </a:p>
+        </p:txBody>
+      </p:sp>
+      <p:sp>
+        <p:nvSpPr>
+          <p:cNvPr id="116" name="TextBox 115">
+            <a:extLst>
+              <a:ext uri="{FF2B5EF4-FFF2-40B4-BE49-F238E27FC236}">
+                <a16:creationId xmlns:a16="http://schemas.microsoft.com/office/drawing/2014/main" id="{095439CB-F2B2-4995-923F-756C5083C8E1}"/>
+              </a:ext>
+            </a:extLst>
+          </p:cNvPr>
+          <p:cNvSpPr txBox="1"/>
+          <p:nvPr/>
+        </p:nvSpPr>
+        <p:spPr>
+          <a:xfrm>
+            <a:off x="10798225" y="4770783"/>
+            <a:ext cx="1071883" cy="369332"/>
+          </a:xfrm>
+          <a:prstGeom prst="rect">
+            <a:avLst/>
+          </a:prstGeom>
+        </p:spPr>
+        <p:style>
+          <a:lnRef idx="0">
+            <a:schemeClr val="accent2"/>
+          </a:lnRef>
+          <a:fillRef idx="3">
+            <a:schemeClr val="accent2"/>
+          </a:fillRef>
+          <a:effectRef idx="3">
+            <a:schemeClr val="accent2"/>
+          </a:effectRef>
+          <a:fontRef idx="minor">
+            <a:schemeClr val="lt1"/>
+          </a:fontRef>
+        </p:style>
+        <p:txBody>
+          <a:bodyPr wrap="square" rtlCol="0">
+            <a:noAutofit/>
+          </a:bodyPr>
+          <a:lstStyle/>
+          <a:p>
+            <a:pPr algn="ctr"/>
+            <a:r>
+              <a:rPr lang="en-US" b="1" dirty="0" err="1"/>
+              <a:t>Adr</a:t>
+            </a:r>
+            <a:r>
+              <a:rPr lang="en-US" b="1" dirty="0"/>
+              <a:t> ..n</a:t>
+            </a:r>
+          </a:p>
+        </p:txBody>
+      </p:sp>
+      <p:sp>
+        <p:nvSpPr>
+          <p:cNvPr id="117" name="Rectangle 116">
+            <a:extLst>
+              <a:ext uri="{FF2B5EF4-FFF2-40B4-BE49-F238E27FC236}">
+                <a16:creationId xmlns:a16="http://schemas.microsoft.com/office/drawing/2014/main" id="{C6A07843-C34B-4FD6-A6D1-4F380574B74C}"/>
+              </a:ext>
+            </a:extLst>
+          </p:cNvPr>
+          <p:cNvSpPr/>
+          <p:nvPr/>
+        </p:nvSpPr>
+        <p:spPr>
+          <a:xfrm>
+            <a:off x="5341121" y="3840887"/>
+            <a:ext cx="6605900" cy="605612"/>
+          </a:xfrm>
+          <a:prstGeom prst="rect">
+            <a:avLst/>
+          </a:prstGeom>
+          <a:noFill/>
+          <a:ln w="19050" cap="flat" cmpd="sng" algn="ctr">
+            <a:solidFill>
+              <a:schemeClr val="bg1">
+                <a:lumMod val="85000"/>
+              </a:schemeClr>
+            </a:solidFill>
+            <a:prstDash val="sysDot"/>
+            <a:round/>
+            <a:headEnd type="none" w="med" len="med"/>
+            <a:tailEnd type="none" w="med" len="med"/>
+          </a:ln>
+        </p:spPr>
+        <p:style>
+          <a:lnRef idx="0">
+            <a:scrgbClr r="0" g="0" b="0"/>
+          </a:lnRef>
+          <a:fillRef idx="0">
+            <a:scrgbClr r="0" g="0" b="0"/>
+          </a:fillRef>
+          <a:effectRef idx="0">
+            <a:scrgbClr r="0" g="0" b="0"/>
+          </a:effectRef>
+          <a:fontRef idx="minor">
+            <a:schemeClr val="accent6"/>
+          </a:fontRef>
+        </p:style>
+        <p:txBody>
+          <a:bodyPr rtlCol="0" anchor="ctr"/>
+          <a:lstStyle/>
+          <a:p>
+            <a:pPr algn="ctr"/>
+            <a:endParaRPr lang="en-US"/>
+          </a:p>
+        </p:txBody>
+      </p:sp>
+      <p:sp>
+        <p:nvSpPr>
+          <p:cNvPr id="118" name="Rectangle 117">
+            <a:extLst>
+              <a:ext uri="{FF2B5EF4-FFF2-40B4-BE49-F238E27FC236}">
+                <a16:creationId xmlns:a16="http://schemas.microsoft.com/office/drawing/2014/main" id="{19C251CD-B02F-4A0C-9419-79195C4520CE}"/>
+              </a:ext>
+            </a:extLst>
+          </p:cNvPr>
+          <p:cNvSpPr/>
+          <p:nvPr/>
+        </p:nvSpPr>
+        <p:spPr>
+          <a:xfrm>
+            <a:off x="5341121" y="4625477"/>
+            <a:ext cx="6605900" cy="605612"/>
+          </a:xfrm>
+          <a:prstGeom prst="rect">
+            <a:avLst/>
+          </a:prstGeom>
+          <a:noFill/>
+          <a:ln w="19050" cap="flat" cmpd="sng" algn="ctr">
+            <a:solidFill>
+              <a:schemeClr val="bg1">
+                <a:lumMod val="85000"/>
+              </a:schemeClr>
+            </a:solidFill>
+            <a:prstDash val="sysDot"/>
+            <a:round/>
+            <a:headEnd type="none" w="med" len="med"/>
+            <a:tailEnd type="none" w="med" len="med"/>
+          </a:ln>
+        </p:spPr>
+        <p:style>
+          <a:lnRef idx="0">
+            <a:scrgbClr r="0" g="0" b="0"/>
+          </a:lnRef>
+          <a:fillRef idx="0">
+            <a:scrgbClr r="0" g="0" b="0"/>
+          </a:fillRef>
+          <a:effectRef idx="0">
+            <a:scrgbClr r="0" g="0" b="0"/>
+          </a:effectRef>
+          <a:fontRef idx="minor">
+            <a:schemeClr val="accent6"/>
+          </a:fontRef>
+        </p:style>
+        <p:txBody>
+          <a:bodyPr rtlCol="0" anchor="ctr"/>
+          <a:lstStyle/>
+          <a:p>
+            <a:pPr algn="ctr"/>
+            <a:endParaRPr lang="en-US"/>
+          </a:p>
+        </p:txBody>
+      </p:sp>
+      <p:sp>
+        <p:nvSpPr>
+          <p:cNvPr id="124" name="Rectangle 123">
+            <a:extLst>
+              <a:ext uri="{FF2B5EF4-FFF2-40B4-BE49-F238E27FC236}">
+                <a16:creationId xmlns:a16="http://schemas.microsoft.com/office/drawing/2014/main" id="{D79B0A2A-ECFA-42B4-AACD-18B02ACA2AB2}"/>
+              </a:ext>
+            </a:extLst>
+          </p:cNvPr>
+          <p:cNvSpPr/>
+          <p:nvPr/>
+        </p:nvSpPr>
+        <p:spPr>
+          <a:xfrm>
+            <a:off x="2278757" y="3601269"/>
+            <a:ext cx="9913243" cy="1899194"/>
+          </a:xfrm>
+          <a:prstGeom prst="rect">
+            <a:avLst/>
+          </a:prstGeom>
+          <a:solidFill>
+            <a:schemeClr val="bg1">
+              <a:alpha val="75000"/>
+            </a:schemeClr>
+          </a:solidFill>
+          <a:ln>
+            <a:noFill/>
+          </a:ln>
+        </p:spPr>
+        <p:style>
+          <a:lnRef idx="2">
+            <a:schemeClr val="accent1">
+              <a:shade val="50000"/>
+            </a:schemeClr>
+          </a:lnRef>
+          <a:fillRef idx="1">
+            <a:schemeClr val="accent1"/>
+          </a:fillRef>
+          <a:effectRef idx="0">
+            <a:schemeClr val="accent1"/>
+          </a:effectRef>
+          <a:fontRef idx="minor">
+            <a:schemeClr val="lt1"/>
+          </a:fontRef>
+        </p:style>
+        <p:txBody>
+          <a:bodyPr rtlCol="0" anchor="ctr"/>
+          <a:lstStyle/>
+          <a:p>
+            <a:pPr algn="ctr"/>
+            <a:endParaRPr lang="en-US"/>
+          </a:p>
+        </p:txBody>
+      </p:sp>
+      <p:cxnSp>
+        <p:nvCxnSpPr>
+          <p:cNvPr id="131" name="Straight Arrow Connector 130">
+            <a:extLst>
+              <a:ext uri="{FF2B5EF4-FFF2-40B4-BE49-F238E27FC236}">
+                <a16:creationId xmlns:a16="http://schemas.microsoft.com/office/drawing/2014/main" id="{53C89FF9-5ED5-4D67-9AE5-A945D79A5EB4}"/>
+              </a:ext>
+            </a:extLst>
+          </p:cNvPr>
+          <p:cNvCxnSpPr>
+            <a:cxnSpLocks/>
+            <a:stCxn id="4" idx="3"/>
+            <a:endCxn id="109" idx="1"/>
+          </p:cNvCxnSpPr>
+          <p:nvPr/>
+        </p:nvCxnSpPr>
+        <p:spPr>
+          <a:xfrm>
+            <a:off x="2110598" y="2066189"/>
+            <a:ext cx="560239" cy="2099137"/>
+          </a:xfrm>
+          <a:prstGeom prst="bentConnector3">
+            <a:avLst>
+              <a:gd name="adj1" fmla="val 50000"/>
+            </a:avLst>
+          </a:prstGeom>
+          <a:ln w="19050">
+            <a:solidFill>
+              <a:schemeClr val="bg1">
+                <a:lumMod val="75000"/>
+              </a:schemeClr>
+            </a:solidFill>
+            <a:prstDash val="solid"/>
+            <a:tailEnd type="triangle"/>
+          </a:ln>
+        </p:spPr>
+        <p:style>
+          <a:lnRef idx="1">
+            <a:schemeClr val="accent1"/>
+          </a:lnRef>
+          <a:fillRef idx="0">
+            <a:schemeClr val="accent1"/>
+          </a:fillRef>
+          <a:effectRef idx="0">
+            <a:schemeClr val="accent1"/>
+          </a:effectRef>
+          <a:fontRef idx="minor">
+            <a:schemeClr val="tx1"/>
+          </a:fontRef>
+        </p:style>
+      </p:cxnSp>
+      <p:cxnSp>
+        <p:nvCxnSpPr>
+          <p:cNvPr id="134" name="Straight Arrow Connector 133">
+            <a:extLst>
+              <a:ext uri="{FF2B5EF4-FFF2-40B4-BE49-F238E27FC236}">
+                <a16:creationId xmlns:a16="http://schemas.microsoft.com/office/drawing/2014/main" id="{17C96197-098E-4EFB-A960-16987018E558}"/>
+              </a:ext>
+            </a:extLst>
+          </p:cNvPr>
+          <p:cNvCxnSpPr>
+            <a:cxnSpLocks/>
+            <a:stCxn id="89" idx="3"/>
+            <a:endCxn id="92" idx="1"/>
+          </p:cNvCxnSpPr>
+          <p:nvPr/>
+        </p:nvCxnSpPr>
+        <p:spPr>
+          <a:xfrm>
+            <a:off x="5021070" y="2066374"/>
+            <a:ext cx="422890" cy="0"/>
+          </a:xfrm>
+          <a:prstGeom prst="straightConnector1">
+            <a:avLst/>
+          </a:prstGeom>
+          <a:ln w="19050">
+            <a:solidFill>
+              <a:schemeClr val="bg1">
+                <a:lumMod val="75000"/>
+              </a:schemeClr>
+            </a:solidFill>
+            <a:prstDash val="solid"/>
+            <a:tailEnd type="triangle"/>
+          </a:ln>
+        </p:spPr>
+        <p:style>
+          <a:lnRef idx="1">
+            <a:schemeClr val="accent1"/>
+          </a:lnRef>
+          <a:fillRef idx="0">
+            <a:schemeClr val="accent1"/>
+          </a:fillRef>
+          <a:effectRef idx="0">
+            <a:schemeClr val="accent1"/>
+          </a:effectRef>
+          <a:fontRef idx="minor">
+            <a:schemeClr val="tx1"/>
+          </a:fontRef>
+        </p:style>
+      </p:cxnSp>
+      <p:cxnSp>
+        <p:nvCxnSpPr>
+          <p:cNvPr id="138" name="Straight Arrow Connector 137">
+            <a:extLst>
+              <a:ext uri="{FF2B5EF4-FFF2-40B4-BE49-F238E27FC236}">
+                <a16:creationId xmlns:a16="http://schemas.microsoft.com/office/drawing/2014/main" id="{95C4DEE5-99EF-4B7F-9F7D-4A025AECE0B7}"/>
+              </a:ext>
+            </a:extLst>
+          </p:cNvPr>
+          <p:cNvCxnSpPr>
+            <a:cxnSpLocks/>
+            <a:stCxn id="109" idx="3"/>
+            <a:endCxn id="110" idx="1"/>
+          </p:cNvCxnSpPr>
+          <p:nvPr/>
+        </p:nvCxnSpPr>
+        <p:spPr>
+          <a:xfrm>
+            <a:off x="5021070" y="4165326"/>
+            <a:ext cx="422890" cy="0"/>
+          </a:xfrm>
+          <a:prstGeom prst="straightConnector1">
+            <a:avLst/>
+          </a:prstGeom>
+          <a:ln w="19050">
+            <a:solidFill>
+              <a:schemeClr val="bg1">
+                <a:lumMod val="75000"/>
+              </a:schemeClr>
+            </a:solidFill>
+            <a:prstDash val="solid"/>
+            <a:tailEnd type="triangle"/>
+          </a:ln>
+        </p:spPr>
+        <p:style>
+          <a:lnRef idx="1">
+            <a:schemeClr val="accent1"/>
+          </a:lnRef>
+          <a:fillRef idx="0">
+            <a:schemeClr val="accent1"/>
+          </a:fillRef>
+          <a:effectRef idx="0">
+            <a:schemeClr val="accent1"/>
+          </a:effectRef>
+          <a:fontRef idx="minor">
+            <a:schemeClr val="tx1"/>
+          </a:fontRef>
+        </p:style>
+      </p:cxnSp>
+      <p:cxnSp>
+        <p:nvCxnSpPr>
+          <p:cNvPr id="141" name="Straight Arrow Connector 140">
+            <a:extLst>
+              <a:ext uri="{FF2B5EF4-FFF2-40B4-BE49-F238E27FC236}">
+                <a16:creationId xmlns:a16="http://schemas.microsoft.com/office/drawing/2014/main" id="{F98BD1C2-515E-4845-9BF2-45F6E5024BCC}"/>
+              </a:ext>
+            </a:extLst>
+          </p:cNvPr>
+          <p:cNvCxnSpPr>
+            <a:cxnSpLocks/>
+            <a:stCxn id="109" idx="3"/>
+            <a:endCxn id="111" idx="1"/>
+          </p:cNvCxnSpPr>
+          <p:nvPr/>
+        </p:nvCxnSpPr>
+        <p:spPr>
+          <a:xfrm>
+            <a:off x="5021070" y="4165326"/>
+            <a:ext cx="422891" cy="790123"/>
+          </a:xfrm>
+          <a:prstGeom prst="bentConnector3">
+            <a:avLst>
+              <a:gd name="adj1" fmla="val 50000"/>
+            </a:avLst>
+          </a:prstGeom>
+          <a:ln w="19050">
+            <a:solidFill>
+              <a:schemeClr val="bg1">
+                <a:lumMod val="75000"/>
+              </a:schemeClr>
+            </a:solidFill>
+            <a:prstDash val="solid"/>
+            <a:tailEnd type="triangle"/>
+          </a:ln>
+        </p:spPr>
+        <p:style>
+          <a:lnRef idx="1">
+            <a:schemeClr val="accent1"/>
+          </a:lnRef>
+          <a:fillRef idx="0">
+            <a:schemeClr val="accent1"/>
+          </a:fillRef>
+          <a:effectRef idx="0">
+            <a:schemeClr val="accent1"/>
+          </a:effectRef>
+          <a:fontRef idx="minor">
+            <a:schemeClr val="tx1"/>
+          </a:fontRef>
+        </p:style>
+      </p:cxnSp>
+      <p:cxnSp>
+        <p:nvCxnSpPr>
+          <p:cNvPr id="144" name="Straight Arrow Connector 143">
+            <a:extLst>
+              <a:ext uri="{FF2B5EF4-FFF2-40B4-BE49-F238E27FC236}">
+                <a16:creationId xmlns:a16="http://schemas.microsoft.com/office/drawing/2014/main" id="{0577376D-2EEE-45EE-AD19-56FF4ECB327F}"/>
+              </a:ext>
+            </a:extLst>
+          </p:cNvPr>
+          <p:cNvCxnSpPr>
+            <a:cxnSpLocks/>
+            <a:stCxn id="89" idx="3"/>
+            <a:endCxn id="93" idx="1"/>
+          </p:cNvCxnSpPr>
+          <p:nvPr/>
+        </p:nvCxnSpPr>
+        <p:spPr>
+          <a:xfrm>
+            <a:off x="5021070" y="2066374"/>
+            <a:ext cx="422891" cy="790123"/>
+          </a:xfrm>
+          <a:prstGeom prst="bentConnector3">
+            <a:avLst>
+              <a:gd name="adj1" fmla="val 50000"/>
+            </a:avLst>
+          </a:prstGeom>
+          <a:ln w="19050">
+            <a:solidFill>
+              <a:schemeClr val="bg1">
+                <a:lumMod val="75000"/>
+              </a:schemeClr>
+            </a:solidFill>
+            <a:prstDash val="solid"/>
+            <a:tailEnd type="triangle"/>
+          </a:ln>
+        </p:spPr>
+        <p:style>
+          <a:lnRef idx="1">
+            <a:schemeClr val="accent1"/>
+          </a:lnRef>
+          <a:fillRef idx="0">
+            <a:schemeClr val="accent1"/>
+          </a:fillRef>
+          <a:effectRef idx="0">
+            <a:schemeClr val="accent1"/>
+          </a:effectRef>
+          <a:fontRef idx="minor">
+            <a:schemeClr val="tx1"/>
+          </a:fontRef>
+        </p:style>
+      </p:cxnSp>
+      <p:cxnSp>
+        <p:nvCxnSpPr>
+          <p:cNvPr id="147" name="Straight Arrow Connector 146">
+            <a:extLst>
+              <a:ext uri="{FF2B5EF4-FFF2-40B4-BE49-F238E27FC236}">
+                <a16:creationId xmlns:a16="http://schemas.microsoft.com/office/drawing/2014/main" id="{FDBA46D3-0E51-4791-8649-979FDE71EC50}"/>
+              </a:ext>
+            </a:extLst>
+          </p:cNvPr>
+          <p:cNvCxnSpPr>
+            <a:cxnSpLocks/>
+            <a:stCxn id="92" idx="2"/>
+            <a:endCxn id="14" idx="2"/>
+          </p:cNvCxnSpPr>
+          <p:nvPr/>
+        </p:nvCxnSpPr>
+        <p:spPr>
+          <a:xfrm rot="5400000" flipH="1" flipV="1">
+            <a:off x="7505940" y="1199326"/>
+            <a:ext cx="186" cy="2103242"/>
+          </a:xfrm>
+          <a:prstGeom prst="curvedConnector3">
+            <a:avLst>
+              <a:gd name="adj1" fmla="val -63174731"/>
+            </a:avLst>
+          </a:prstGeom>
+          <a:ln w="19050">
+            <a:solidFill>
+              <a:schemeClr val="bg1">
+                <a:lumMod val="75000"/>
+              </a:schemeClr>
+            </a:solidFill>
+            <a:prstDash val="solid"/>
+            <a:tailEnd type="triangle"/>
+          </a:ln>
+        </p:spPr>
+        <p:style>
+          <a:lnRef idx="1">
+            <a:schemeClr val="accent1"/>
+          </a:lnRef>
+          <a:fillRef idx="0">
+            <a:schemeClr val="accent1"/>
+          </a:fillRef>
+          <a:effectRef idx="0">
+            <a:schemeClr val="accent1"/>
+          </a:effectRef>
+          <a:fontRef idx="minor">
+            <a:schemeClr val="tx1"/>
+          </a:fontRef>
+        </p:style>
+      </p:cxnSp>
+      <p:cxnSp>
+        <p:nvCxnSpPr>
+          <p:cNvPr id="152" name="Straight Arrow Connector 146">
+            <a:extLst>
+              <a:ext uri="{FF2B5EF4-FFF2-40B4-BE49-F238E27FC236}">
+                <a16:creationId xmlns:a16="http://schemas.microsoft.com/office/drawing/2014/main" id="{F089E87A-73D4-4BE8-92D5-F4C1AC5ADCA5}"/>
+              </a:ext>
+            </a:extLst>
+          </p:cNvPr>
+          <p:cNvCxnSpPr>
+            <a:cxnSpLocks/>
+            <a:stCxn id="92" idx="2"/>
+            <a:endCxn id="94" idx="2"/>
+          </p:cNvCxnSpPr>
+          <p:nvPr/>
+        </p:nvCxnSpPr>
+        <p:spPr>
+          <a:xfrm rot="5400000" flipH="1" flipV="1">
+            <a:off x="8169608" y="535657"/>
+            <a:ext cx="186" cy="3430579"/>
+          </a:xfrm>
+          <a:prstGeom prst="curvedConnector3">
+            <a:avLst>
+              <a:gd name="adj1" fmla="val -95336022"/>
+            </a:avLst>
+          </a:prstGeom>
+          <a:ln w="19050">
+            <a:solidFill>
+              <a:schemeClr val="bg1">
+                <a:lumMod val="75000"/>
+              </a:schemeClr>
+            </a:solidFill>
+            <a:prstDash val="solid"/>
+            <a:tailEnd type="triangle"/>
+          </a:ln>
+        </p:spPr>
+        <p:style>
+          <a:lnRef idx="1">
+            <a:schemeClr val="accent1"/>
+          </a:lnRef>
+          <a:fillRef idx="0">
+            <a:schemeClr val="accent1"/>
+          </a:fillRef>
+          <a:effectRef idx="0">
+            <a:schemeClr val="accent1"/>
+          </a:effectRef>
+          <a:fontRef idx="minor">
+            <a:schemeClr val="tx1"/>
+          </a:fontRef>
+        </p:style>
+      </p:cxnSp>
+      <p:cxnSp>
+        <p:nvCxnSpPr>
+          <p:cNvPr id="155" name="Straight Arrow Connector 146">
+            <a:extLst>
+              <a:ext uri="{FF2B5EF4-FFF2-40B4-BE49-F238E27FC236}">
+                <a16:creationId xmlns:a16="http://schemas.microsoft.com/office/drawing/2014/main" id="{67D59EB7-10D8-45BC-9FF0-05B04D33CCCB}"/>
+              </a:ext>
+            </a:extLst>
+          </p:cNvPr>
+          <p:cNvCxnSpPr>
+            <a:cxnSpLocks/>
+            <a:stCxn id="92" idx="2"/>
+            <a:endCxn id="95" idx="2"/>
+          </p:cNvCxnSpPr>
+          <p:nvPr/>
+        </p:nvCxnSpPr>
+        <p:spPr>
+          <a:xfrm rot="5400000" flipH="1" flipV="1">
+            <a:off x="8894196" y="-188931"/>
+            <a:ext cx="186" cy="4879755"/>
+          </a:xfrm>
+          <a:prstGeom prst="curvedConnector3">
+            <a:avLst>
+              <a:gd name="adj1" fmla="val -118310215"/>
+            </a:avLst>
+          </a:prstGeom>
+          <a:ln w="19050">
+            <a:solidFill>
+              <a:schemeClr val="bg1">
+                <a:lumMod val="75000"/>
+              </a:schemeClr>
+            </a:solidFill>
+            <a:prstDash val="solid"/>
+            <a:tailEnd type="triangle"/>
+          </a:ln>
+        </p:spPr>
+        <p:style>
+          <a:lnRef idx="1">
+            <a:schemeClr val="accent1"/>
+          </a:lnRef>
+          <a:fillRef idx="0">
+            <a:schemeClr val="accent1"/>
+          </a:fillRef>
+          <a:effectRef idx="0">
+            <a:schemeClr val="accent1"/>
+          </a:effectRef>
+          <a:fontRef idx="minor">
+            <a:schemeClr val="tx1"/>
+          </a:fontRef>
+        </p:style>
+      </p:cxnSp>
+      <p:cxnSp>
+        <p:nvCxnSpPr>
+          <p:cNvPr id="174" name="Straight Arrow Connector 146">
+            <a:extLst>
+              <a:ext uri="{FF2B5EF4-FFF2-40B4-BE49-F238E27FC236}">
+                <a16:creationId xmlns:a16="http://schemas.microsoft.com/office/drawing/2014/main" id="{9D704740-7B75-4892-B1C1-7FE3A2C34755}"/>
+              </a:ext>
+            </a:extLst>
+          </p:cNvPr>
+          <p:cNvCxnSpPr>
+            <a:cxnSpLocks/>
+            <a:stCxn id="93" idx="2"/>
+            <a:endCxn id="96" idx="2"/>
+          </p:cNvCxnSpPr>
+          <p:nvPr/>
+        </p:nvCxnSpPr>
+        <p:spPr>
+          <a:xfrm rot="16200000" flipH="1">
+            <a:off x="7506033" y="1989542"/>
+            <a:ext cx="12700" cy="2103242"/>
+          </a:xfrm>
+          <a:prstGeom prst="curvedConnector3">
+            <a:avLst>
+              <a:gd name="adj1" fmla="val 992528"/>
+            </a:avLst>
+          </a:prstGeom>
+          <a:ln w="19050">
+            <a:solidFill>
+              <a:schemeClr val="bg1">
+                <a:lumMod val="75000"/>
+              </a:schemeClr>
+            </a:solidFill>
+            <a:prstDash val="solid"/>
+            <a:tailEnd type="triangle"/>
+          </a:ln>
+        </p:spPr>
+        <p:style>
+          <a:lnRef idx="1">
+            <a:schemeClr val="accent1"/>
+          </a:lnRef>
+          <a:fillRef idx="0">
+            <a:schemeClr val="accent1"/>
+          </a:fillRef>
+          <a:effectRef idx="0">
+            <a:schemeClr val="accent1"/>
+          </a:effectRef>
+          <a:fontRef idx="minor">
+            <a:schemeClr val="tx1"/>
+          </a:fontRef>
+        </p:style>
+      </p:cxnSp>
+      <p:cxnSp>
+        <p:nvCxnSpPr>
+          <p:cNvPr id="175" name="Straight Arrow Connector 146">
+            <a:extLst>
+              <a:ext uri="{FF2B5EF4-FFF2-40B4-BE49-F238E27FC236}">
+                <a16:creationId xmlns:a16="http://schemas.microsoft.com/office/drawing/2014/main" id="{ABA49349-E0B5-4562-9893-9362F31E0E19}"/>
+              </a:ext>
+            </a:extLst>
+          </p:cNvPr>
+          <p:cNvCxnSpPr>
+            <a:cxnSpLocks/>
+            <a:stCxn id="93" idx="2"/>
+            <a:endCxn id="97" idx="2"/>
+          </p:cNvCxnSpPr>
+          <p:nvPr/>
+        </p:nvCxnSpPr>
+        <p:spPr>
+          <a:xfrm rot="16200000" flipH="1">
+            <a:off x="8169701" y="1325873"/>
+            <a:ext cx="12700" cy="3430579"/>
+          </a:xfrm>
+          <a:prstGeom prst="curvedConnector3">
+            <a:avLst>
+              <a:gd name="adj1" fmla="val 1396244"/>
+            </a:avLst>
+          </a:prstGeom>
+          <a:ln w="19050">
+            <a:solidFill>
+              <a:schemeClr val="bg1">
+                <a:lumMod val="75000"/>
+              </a:schemeClr>
+            </a:solidFill>
+            <a:prstDash val="solid"/>
+            <a:tailEnd type="triangle"/>
+          </a:ln>
+        </p:spPr>
+        <p:style>
+          <a:lnRef idx="1">
+            <a:schemeClr val="accent1"/>
+          </a:lnRef>
+          <a:fillRef idx="0">
+            <a:schemeClr val="accent1"/>
+          </a:fillRef>
+          <a:effectRef idx="0">
+            <a:schemeClr val="accent1"/>
+          </a:effectRef>
+          <a:fontRef idx="minor">
+            <a:schemeClr val="tx1"/>
+          </a:fontRef>
+        </p:style>
+      </p:cxnSp>
+      <p:cxnSp>
+        <p:nvCxnSpPr>
+          <p:cNvPr id="176" name="Straight Arrow Connector 146">
+            <a:extLst>
+              <a:ext uri="{FF2B5EF4-FFF2-40B4-BE49-F238E27FC236}">
+                <a16:creationId xmlns:a16="http://schemas.microsoft.com/office/drawing/2014/main" id="{79DBC545-639E-4B64-B601-C0ED10E01AF3}"/>
+              </a:ext>
+            </a:extLst>
+          </p:cNvPr>
+          <p:cNvCxnSpPr>
+            <a:cxnSpLocks/>
+            <a:stCxn id="93" idx="2"/>
+            <a:endCxn id="98" idx="2"/>
+          </p:cNvCxnSpPr>
+          <p:nvPr/>
+        </p:nvCxnSpPr>
+        <p:spPr>
+          <a:xfrm rot="16200000" flipH="1">
+            <a:off x="8894289" y="601285"/>
+            <a:ext cx="12700" cy="4879755"/>
+          </a:xfrm>
+          <a:prstGeom prst="curvedConnector3">
+            <a:avLst>
+              <a:gd name="adj1" fmla="val 1800000"/>
+            </a:avLst>
+          </a:prstGeom>
+          <a:ln w="19050">
+            <a:solidFill>
+              <a:schemeClr val="bg1">
+                <a:lumMod val="75000"/>
+              </a:schemeClr>
+            </a:solidFill>
+            <a:prstDash val="solid"/>
+            <a:tailEnd type="triangle"/>
+          </a:ln>
+        </p:spPr>
+        <p:style>
+          <a:lnRef idx="1">
+            <a:schemeClr val="accent1"/>
+          </a:lnRef>
+          <a:fillRef idx="0">
+            <a:schemeClr val="accent1"/>
+          </a:fillRef>
+          <a:effectRef idx="0">
+            <a:schemeClr val="accent1"/>
+          </a:effectRef>
+          <a:fontRef idx="minor">
+            <a:schemeClr val="tx1"/>
+          </a:fontRef>
+        </p:style>
+      </p:cxnSp>
+      <p:cxnSp>
+        <p:nvCxnSpPr>
+          <p:cNvPr id="177" name="Straight Arrow Connector 146">
+            <a:extLst>
+              <a:ext uri="{FF2B5EF4-FFF2-40B4-BE49-F238E27FC236}">
+                <a16:creationId xmlns:a16="http://schemas.microsoft.com/office/drawing/2014/main" id="{1082DDAE-9EC6-4933-BCB8-8A4AA46962CB}"/>
+              </a:ext>
+            </a:extLst>
+          </p:cNvPr>
+          <p:cNvCxnSpPr>
+            <a:cxnSpLocks/>
+            <a:stCxn id="110" idx="2"/>
+            <a:endCxn id="106" idx="2"/>
+          </p:cNvCxnSpPr>
+          <p:nvPr/>
+        </p:nvCxnSpPr>
+        <p:spPr>
+          <a:xfrm rot="5400000" flipH="1" flipV="1">
+            <a:off x="7505940" y="3298278"/>
+            <a:ext cx="186" cy="2103242"/>
+          </a:xfrm>
+          <a:prstGeom prst="curvedConnector3">
+            <a:avLst>
+              <a:gd name="adj1" fmla="val -63174194"/>
+            </a:avLst>
+          </a:prstGeom>
+          <a:ln w="19050">
+            <a:solidFill>
+              <a:schemeClr val="bg1">
+                <a:lumMod val="75000"/>
+              </a:schemeClr>
+            </a:solidFill>
+            <a:prstDash val="solid"/>
+            <a:tailEnd type="triangle"/>
+          </a:ln>
+        </p:spPr>
+        <p:style>
+          <a:lnRef idx="1">
+            <a:schemeClr val="accent1"/>
+          </a:lnRef>
+          <a:fillRef idx="0">
+            <a:schemeClr val="accent1"/>
+          </a:fillRef>
+          <a:effectRef idx="0">
+            <a:schemeClr val="accent1"/>
+          </a:effectRef>
+          <a:fontRef idx="minor">
+            <a:schemeClr val="tx1"/>
+          </a:fontRef>
+        </p:style>
+      </p:cxnSp>
+      <p:cxnSp>
+        <p:nvCxnSpPr>
+          <p:cNvPr id="178" name="Straight Arrow Connector 146">
+            <a:extLst>
+              <a:ext uri="{FF2B5EF4-FFF2-40B4-BE49-F238E27FC236}">
+                <a16:creationId xmlns:a16="http://schemas.microsoft.com/office/drawing/2014/main" id="{F1B16165-4F5B-4DDA-8AEE-D9D243031512}"/>
+              </a:ext>
+            </a:extLst>
+          </p:cNvPr>
+          <p:cNvCxnSpPr>
+            <a:cxnSpLocks/>
+            <a:stCxn id="110" idx="2"/>
+            <a:endCxn id="113" idx="2"/>
+          </p:cNvCxnSpPr>
+          <p:nvPr/>
+        </p:nvCxnSpPr>
+        <p:spPr>
+          <a:xfrm rot="5400000" flipH="1" flipV="1">
+            <a:off x="8894196" y="1910021"/>
+            <a:ext cx="186" cy="4879755"/>
+          </a:xfrm>
+          <a:prstGeom prst="curvedConnector3">
+            <a:avLst>
+              <a:gd name="adj1" fmla="val -104525269"/>
+            </a:avLst>
+          </a:prstGeom>
+          <a:ln w="19050">
+            <a:solidFill>
+              <a:schemeClr val="bg1">
+                <a:lumMod val="75000"/>
+              </a:schemeClr>
+            </a:solidFill>
+            <a:prstDash val="solid"/>
+            <a:tailEnd type="triangle"/>
+          </a:ln>
+        </p:spPr>
+        <p:style>
+          <a:lnRef idx="1">
+            <a:schemeClr val="accent1"/>
+          </a:lnRef>
+          <a:fillRef idx="0">
+            <a:schemeClr val="accent1"/>
+          </a:fillRef>
+          <a:effectRef idx="0">
+            <a:schemeClr val="accent1"/>
+          </a:effectRef>
+          <a:fontRef idx="minor">
+            <a:schemeClr val="tx1"/>
+          </a:fontRef>
+        </p:style>
+      </p:cxnSp>
+      <p:cxnSp>
+        <p:nvCxnSpPr>
+          <p:cNvPr id="179" name="Straight Arrow Connector 146">
+            <a:extLst>
+              <a:ext uri="{FF2B5EF4-FFF2-40B4-BE49-F238E27FC236}">
+                <a16:creationId xmlns:a16="http://schemas.microsoft.com/office/drawing/2014/main" id="{8B524A5D-8420-4916-A21D-7B6B85D58D50}"/>
+              </a:ext>
+            </a:extLst>
+          </p:cNvPr>
+          <p:cNvCxnSpPr>
+            <a:cxnSpLocks/>
+            <a:stCxn id="110" idx="2"/>
+            <a:endCxn id="112" idx="2"/>
+          </p:cNvCxnSpPr>
+          <p:nvPr/>
+        </p:nvCxnSpPr>
+        <p:spPr>
+          <a:xfrm rot="5400000" flipH="1" flipV="1">
+            <a:off x="8169608" y="2634609"/>
+            <a:ext cx="186" cy="3430579"/>
+          </a:xfrm>
+          <a:prstGeom prst="curvedConnector3">
+            <a:avLst>
+              <a:gd name="adj1" fmla="val -76958065"/>
+            </a:avLst>
+          </a:prstGeom>
+          <a:ln w="19050">
+            <a:solidFill>
+              <a:schemeClr val="bg1">
+                <a:lumMod val="75000"/>
+              </a:schemeClr>
+            </a:solidFill>
+            <a:prstDash val="solid"/>
+            <a:tailEnd type="triangle"/>
+          </a:ln>
+        </p:spPr>
+        <p:style>
+          <a:lnRef idx="1">
+            <a:schemeClr val="accent1"/>
+          </a:lnRef>
+          <a:fillRef idx="0">
+            <a:schemeClr val="accent1"/>
+          </a:fillRef>
+          <a:effectRef idx="0">
+            <a:schemeClr val="accent1"/>
+          </a:effectRef>
+          <a:fontRef idx="minor">
+            <a:schemeClr val="tx1"/>
+          </a:fontRef>
+        </p:style>
+      </p:cxnSp>
+      <p:cxnSp>
+        <p:nvCxnSpPr>
+          <p:cNvPr id="180" name="Straight Arrow Connector 146">
+            <a:extLst>
+              <a:ext uri="{FF2B5EF4-FFF2-40B4-BE49-F238E27FC236}">
+                <a16:creationId xmlns:a16="http://schemas.microsoft.com/office/drawing/2014/main" id="{7D02B58D-5737-4F1F-980B-415412F10E15}"/>
+              </a:ext>
+            </a:extLst>
+          </p:cNvPr>
+          <p:cNvCxnSpPr>
+            <a:cxnSpLocks/>
+            <a:stCxn id="111" idx="2"/>
+            <a:endCxn id="115" idx="2"/>
+          </p:cNvCxnSpPr>
+          <p:nvPr/>
+        </p:nvCxnSpPr>
+        <p:spPr>
+          <a:xfrm rot="16200000" flipH="1">
+            <a:off x="8169701" y="3424825"/>
+            <a:ext cx="12700" cy="3430579"/>
+          </a:xfrm>
+          <a:prstGeom prst="curvedConnector3">
+            <a:avLst>
+              <a:gd name="adj1" fmla="val 1127102"/>
+            </a:avLst>
+          </a:prstGeom>
+          <a:ln w="19050">
+            <a:solidFill>
+              <a:schemeClr val="bg1">
+                <a:lumMod val="75000"/>
+              </a:schemeClr>
+            </a:solidFill>
+            <a:prstDash val="solid"/>
+            <a:tailEnd type="triangle"/>
+          </a:ln>
+        </p:spPr>
+        <p:style>
+          <a:lnRef idx="1">
+            <a:schemeClr val="accent1"/>
+          </a:lnRef>
+          <a:fillRef idx="0">
+            <a:schemeClr val="accent1"/>
+          </a:fillRef>
+          <a:effectRef idx="0">
+            <a:schemeClr val="accent1"/>
+          </a:effectRef>
+          <a:fontRef idx="minor">
+            <a:schemeClr val="tx1"/>
+          </a:fontRef>
+        </p:style>
+      </p:cxnSp>
+      <p:cxnSp>
+        <p:nvCxnSpPr>
+          <p:cNvPr id="181" name="Straight Arrow Connector 146">
+            <a:extLst>
+              <a:ext uri="{FF2B5EF4-FFF2-40B4-BE49-F238E27FC236}">
+                <a16:creationId xmlns:a16="http://schemas.microsoft.com/office/drawing/2014/main" id="{F7767208-9CBD-4E66-9FF5-3F749E1020A7}"/>
+              </a:ext>
+            </a:extLst>
+          </p:cNvPr>
+          <p:cNvCxnSpPr>
+            <a:cxnSpLocks/>
+            <a:stCxn id="111" idx="2"/>
+            <a:endCxn id="114" idx="2"/>
+          </p:cNvCxnSpPr>
+          <p:nvPr/>
+        </p:nvCxnSpPr>
+        <p:spPr>
+          <a:xfrm rot="16200000" flipH="1">
+            <a:off x="7506033" y="4088494"/>
+            <a:ext cx="12700" cy="2103242"/>
+          </a:xfrm>
+          <a:prstGeom prst="curvedConnector3">
+            <a:avLst>
+              <a:gd name="adj1" fmla="val 925236"/>
+            </a:avLst>
+          </a:prstGeom>
+          <a:ln w="19050">
+            <a:solidFill>
+              <a:schemeClr val="bg1">
+                <a:lumMod val="75000"/>
+              </a:schemeClr>
+            </a:solidFill>
+            <a:prstDash val="solid"/>
+            <a:tailEnd type="triangle"/>
+          </a:ln>
+        </p:spPr>
+        <p:style>
+          <a:lnRef idx="1">
+            <a:schemeClr val="accent1"/>
+          </a:lnRef>
+          <a:fillRef idx="0">
+            <a:schemeClr val="accent1"/>
+          </a:fillRef>
+          <a:effectRef idx="0">
+            <a:schemeClr val="accent1"/>
+          </a:effectRef>
+          <a:fontRef idx="minor">
+            <a:schemeClr val="tx1"/>
+          </a:fontRef>
+        </p:style>
+      </p:cxnSp>
+      <p:cxnSp>
+        <p:nvCxnSpPr>
+          <p:cNvPr id="182" name="Straight Arrow Connector 146">
+            <a:extLst>
+              <a:ext uri="{FF2B5EF4-FFF2-40B4-BE49-F238E27FC236}">
+                <a16:creationId xmlns:a16="http://schemas.microsoft.com/office/drawing/2014/main" id="{EB5A8602-870C-4889-8055-653AD0F8AC28}"/>
+              </a:ext>
+            </a:extLst>
+          </p:cNvPr>
+          <p:cNvCxnSpPr>
+            <a:cxnSpLocks/>
+            <a:stCxn id="111" idx="2"/>
+            <a:endCxn id="116" idx="2"/>
+          </p:cNvCxnSpPr>
+          <p:nvPr/>
+        </p:nvCxnSpPr>
+        <p:spPr>
+          <a:xfrm rot="16200000" flipH="1">
+            <a:off x="8894289" y="2700237"/>
+            <a:ext cx="12700" cy="4879755"/>
+          </a:xfrm>
+          <a:prstGeom prst="curvedConnector3">
+            <a:avLst>
+              <a:gd name="adj1" fmla="val 1665409"/>
+            </a:avLst>
+          </a:prstGeom>
+          <a:ln w="19050">
+            <a:solidFill>
+              <a:schemeClr val="bg1">
+                <a:lumMod val="75000"/>
+              </a:schemeClr>
+            </a:solidFill>
+            <a:prstDash val="solid"/>
+            <a:tailEnd type="triangle"/>
+          </a:ln>
+        </p:spPr>
+        <p:style>
+          <a:lnRef idx="1">
+            <a:schemeClr val="accent1"/>
+          </a:lnRef>
+          <a:fillRef idx="0">
+            <a:schemeClr val="accent1"/>
+          </a:fillRef>
+          <a:effectRef idx="0">
+            <a:schemeClr val="accent1"/>
+          </a:effectRef>
+          <a:fontRef idx="minor">
+            <a:schemeClr val="tx1"/>
+          </a:fontRef>
+        </p:style>
+      </p:cxnSp>
+      <p:sp>
+        <p:nvSpPr>
+          <p:cNvPr id="211" name="TextBox 210">
+            <a:extLst>
+              <a:ext uri="{FF2B5EF4-FFF2-40B4-BE49-F238E27FC236}">
+                <a16:creationId xmlns:a16="http://schemas.microsoft.com/office/drawing/2014/main" id="{773FA2D6-136C-4A9D-A5CA-217F04E95319}"/>
+              </a:ext>
+            </a:extLst>
+          </p:cNvPr>
+          <p:cNvSpPr txBox="1"/>
+          <p:nvPr/>
+        </p:nvSpPr>
+        <p:spPr>
+          <a:xfrm>
+            <a:off x="9843408" y="6581001"/>
+            <a:ext cx="2348592" cy="276999"/>
+          </a:xfrm>
+          <a:prstGeom prst="rect">
+            <a:avLst/>
+          </a:prstGeom>
+          <a:noFill/>
+        </p:spPr>
+        <p:txBody>
+          <a:bodyPr wrap="none" rtlCol="0">
+            <a:spAutoFit/>
+          </a:bodyPr>
+          <a:lstStyle/>
+          <a:p>
+            <a:pPr algn="r"/>
+            <a:r>
+              <a:rPr lang="en-US" sz="1200" i="1" dirty="0"/>
+              <a:t>Source: BIP32; simplified by author</a:t>
+            </a:r>
+          </a:p>
+        </p:txBody>
+      </p:sp>
+      <p:sp>
+        <p:nvSpPr>
+          <p:cNvPr id="212" name="TextBox 211">
+            <a:extLst>
+              <a:ext uri="{FF2B5EF4-FFF2-40B4-BE49-F238E27FC236}">
+                <a16:creationId xmlns:a16="http://schemas.microsoft.com/office/drawing/2014/main" id="{315B78F0-E657-4AF3-BC66-41C3DDC829DB}"/>
+              </a:ext>
+            </a:extLst>
+          </p:cNvPr>
+          <p:cNvSpPr txBox="1"/>
+          <p:nvPr/>
+        </p:nvSpPr>
+        <p:spPr>
+          <a:xfrm>
+            <a:off x="2670836" y="90409"/>
+            <a:ext cx="2350233" cy="276999"/>
+          </a:xfrm>
+          <a:prstGeom prst="rect">
+            <a:avLst/>
+          </a:prstGeom>
+          <a:noFill/>
+        </p:spPr>
+        <p:txBody>
+          <a:bodyPr wrap="square" rtlCol="0">
+            <a:spAutoFit/>
+          </a:bodyPr>
+          <a:lstStyle/>
+          <a:p>
+            <a:pPr algn="ctr"/>
+            <a:r>
+              <a:rPr lang="en-US" sz="1200" i="1" dirty="0">
+                <a:solidFill>
+                  <a:schemeClr val="bg1">
+                    <a:lumMod val="65000"/>
+                  </a:schemeClr>
+                </a:solidFill>
+              </a:rPr>
+              <a:t>Child Key Derivation Function</a:t>
+            </a:r>
+          </a:p>
+        </p:txBody>
+      </p:sp>
+      <p:sp>
+        <p:nvSpPr>
+          <p:cNvPr id="213" name="TextBox 212">
+            <a:extLst>
+              <a:ext uri="{FF2B5EF4-FFF2-40B4-BE49-F238E27FC236}">
+                <a16:creationId xmlns:a16="http://schemas.microsoft.com/office/drawing/2014/main" id="{811F3581-23F0-4256-B92C-752C2A64ED83}"/>
+              </a:ext>
+            </a:extLst>
+          </p:cNvPr>
+          <p:cNvSpPr txBox="1"/>
+          <p:nvPr/>
+        </p:nvSpPr>
+        <p:spPr>
+          <a:xfrm>
+            <a:off x="5443960" y="90409"/>
+            <a:ext cx="2020903" cy="276999"/>
+          </a:xfrm>
+          <a:prstGeom prst="rect">
+            <a:avLst/>
+          </a:prstGeom>
+          <a:noFill/>
+        </p:spPr>
+        <p:txBody>
+          <a:bodyPr wrap="square" rtlCol="0">
+            <a:spAutoFit/>
+          </a:bodyPr>
+          <a:lstStyle/>
+          <a:p>
+            <a:pPr algn="ctr"/>
+            <a:r>
+              <a:rPr lang="en-US" sz="1200" i="1" dirty="0">
+                <a:solidFill>
+                  <a:schemeClr val="bg1">
+                    <a:lumMod val="65000"/>
+                  </a:schemeClr>
+                </a:solidFill>
+              </a:rPr>
+              <a:t>Child Key Derivation Function</a:t>
+            </a:r>
+          </a:p>
+        </p:txBody>
+      </p:sp>
+      <p:cxnSp>
+        <p:nvCxnSpPr>
+          <p:cNvPr id="215" name="Straight Arrow Connector 214">
+            <a:extLst>
+              <a:ext uri="{FF2B5EF4-FFF2-40B4-BE49-F238E27FC236}">
+                <a16:creationId xmlns:a16="http://schemas.microsoft.com/office/drawing/2014/main" id="{D9F6DC24-C086-49E8-9879-F9FB47AA7B9D}"/>
+              </a:ext>
+            </a:extLst>
+          </p:cNvPr>
+          <p:cNvCxnSpPr/>
+          <p:nvPr/>
+        </p:nvCxnSpPr>
+        <p:spPr>
+          <a:xfrm>
+            <a:off x="1761688" y="226503"/>
+            <a:ext cx="1057013" cy="0"/>
+          </a:xfrm>
+          <a:prstGeom prst="straightConnector1">
+            <a:avLst/>
+          </a:prstGeom>
+          <a:ln w="19050">
+            <a:solidFill>
+              <a:schemeClr val="bg1">
+                <a:lumMod val="75000"/>
+              </a:schemeClr>
+            </a:solidFill>
+            <a:prstDash val="solid"/>
+            <a:tailEnd type="triangle"/>
+          </a:ln>
+        </p:spPr>
+        <p:style>
+          <a:lnRef idx="1">
+            <a:schemeClr val="accent1"/>
+          </a:lnRef>
+          <a:fillRef idx="0">
+            <a:schemeClr val="accent1"/>
+          </a:fillRef>
+          <a:effectRef idx="0">
+            <a:schemeClr val="accent1"/>
+          </a:effectRef>
+          <a:fontRef idx="minor">
+            <a:schemeClr val="tx1"/>
+          </a:fontRef>
+        </p:style>
+      </p:cxnSp>
+      <p:cxnSp>
+        <p:nvCxnSpPr>
+          <p:cNvPr id="216" name="Straight Arrow Connector 215">
+            <a:extLst>
+              <a:ext uri="{FF2B5EF4-FFF2-40B4-BE49-F238E27FC236}">
+                <a16:creationId xmlns:a16="http://schemas.microsoft.com/office/drawing/2014/main" id="{91FEC5FD-2B96-45B5-B1F0-BFB079CCF498}"/>
+              </a:ext>
+            </a:extLst>
+          </p:cNvPr>
+          <p:cNvCxnSpPr>
+            <a:cxnSpLocks/>
+            <a:endCxn id="213" idx="1"/>
+          </p:cNvCxnSpPr>
+          <p:nvPr/>
+        </p:nvCxnSpPr>
+        <p:spPr>
+          <a:xfrm>
+            <a:off x="4860646" y="226503"/>
+            <a:ext cx="583314" cy="2406"/>
+          </a:xfrm>
+          <a:prstGeom prst="straightConnector1">
+            <a:avLst/>
+          </a:prstGeom>
+          <a:ln w="19050">
+            <a:solidFill>
+              <a:schemeClr val="bg1">
+                <a:lumMod val="75000"/>
+              </a:schemeClr>
+            </a:solidFill>
+            <a:prstDash val="solid"/>
+            <a:tailEnd type="triangle"/>
+          </a:ln>
+        </p:spPr>
+        <p:style>
+          <a:lnRef idx="1">
+            <a:schemeClr val="accent1"/>
+          </a:lnRef>
+          <a:fillRef idx="0">
+            <a:schemeClr val="accent1"/>
+          </a:fillRef>
+          <a:effectRef idx="0">
+            <a:schemeClr val="accent1"/>
+          </a:effectRef>
+          <a:fontRef idx="minor">
+            <a:schemeClr val="tx1"/>
+          </a:fontRef>
+        </p:style>
+      </p:cxnSp>
+      <p:sp>
+        <p:nvSpPr>
+          <p:cNvPr id="219" name="TextBox 218">
+            <a:extLst>
+              <a:ext uri="{FF2B5EF4-FFF2-40B4-BE49-F238E27FC236}">
+                <a16:creationId xmlns:a16="http://schemas.microsoft.com/office/drawing/2014/main" id="{32A6B1C0-0C18-427D-91E1-B0FDCE938FED}"/>
+              </a:ext>
+            </a:extLst>
+          </p:cNvPr>
+          <p:cNvSpPr txBox="1"/>
+          <p:nvPr/>
+        </p:nvSpPr>
+        <p:spPr>
+          <a:xfrm>
+            <a:off x="2670836" y="274890"/>
+            <a:ext cx="2350233" cy="276999"/>
+          </a:xfrm>
+          <a:prstGeom prst="rect">
+            <a:avLst/>
+          </a:prstGeom>
+          <a:noFill/>
+        </p:spPr>
+        <p:txBody>
+          <a:bodyPr wrap="square" rtlCol="0">
+            <a:spAutoFit/>
+          </a:bodyPr>
+          <a:lstStyle/>
+          <a:p>
+            <a:pPr algn="ctr"/>
+            <a:r>
+              <a:rPr lang="en-US" sz="1200" i="1" dirty="0">
+                <a:solidFill>
+                  <a:schemeClr val="bg1">
+                    <a:lumMod val="65000"/>
+                  </a:schemeClr>
+                </a:solidFill>
+              </a:rPr>
+              <a:t>BIP32 hardened</a:t>
+            </a:r>
+          </a:p>
+        </p:txBody>
+      </p:sp>
+    </p:spTree>
+    <p:extLst>
+      <p:ext uri="{BB962C8B-B14F-4D97-AF65-F5344CB8AC3E}">
+        <p14:creationId xmlns:p14="http://schemas.microsoft.com/office/powerpoint/2010/main" val="4051614260"/>
+      </p:ext>
+    </p:extLst>
+  </p:cSld>
+  <p:clrMapOvr>
+    <a:masterClrMapping/>
+  </p:clrMapOvr>
+</p:sld>
+</file>
+
 <file path=ppt/theme/theme1.xml><?xml version="1.0" encoding="utf-8"?>
 <a:theme xmlns:a="http://schemas.openxmlformats.org/drawingml/2006/main" name="Office Theme">
   <a:themeElements>

</xml_diff>